<commit_message>
MAJ du cours sur les systèmes asservis. Positionnement de poles dans le plan complexe.
</commit_message>
<xml_diff>
--- a/6_SystemesAsservis/Cours/png/images.pptx
+++ b/6_SystemesAsservis/Cours/png/images.pptx
@@ -5,11 +5,13 @@
     <p:sldMasterId id="2147483648" r:id="rId1"/>
   </p:sldMasterIdLst>
   <p:sldIdLst>
-    <p:sldId id="256" r:id="rId2"/>
-    <p:sldId id="257" r:id="rId3"/>
-    <p:sldId id="258" r:id="rId4"/>
-    <p:sldId id="259" r:id="rId5"/>
-    <p:sldId id="260" r:id="rId6"/>
+    <p:sldId id="261" r:id="rId2"/>
+    <p:sldId id="262" r:id="rId3"/>
+    <p:sldId id="256" r:id="rId4"/>
+    <p:sldId id="257" r:id="rId5"/>
+    <p:sldId id="258" r:id="rId6"/>
+    <p:sldId id="259" r:id="rId7"/>
+    <p:sldId id="260" r:id="rId8"/>
   </p:sldIdLst>
   <p:sldSz cx="9144000" cy="6858000" type="screen4x3"/>
   <p:notesSz cx="6858000" cy="9144000"/>
@@ -292,7 +294,7 @@
           <a:p>
             <a:fld id="{AA309A6D-C09C-4548-B29A-6CF363A7E532}" type="datetimeFigureOut">
               <a:rPr lang="fr-FR" smtClean="0"/>
-              <a:t>15/11/2011</a:t>
+              <a:t>28/01/2014</a:t>
             </a:fld>
             <a:endParaRPr lang="fr-BE"/>
           </a:p>
@@ -457,7 +459,7 @@
           <a:p>
             <a:fld id="{AA309A6D-C09C-4548-B29A-6CF363A7E532}" type="datetimeFigureOut">
               <a:rPr lang="fr-FR" smtClean="0"/>
-              <a:t>15/11/2011</a:t>
+              <a:t>28/01/2014</a:t>
             </a:fld>
             <a:endParaRPr lang="fr-BE"/>
           </a:p>
@@ -632,7 +634,7 @@
           <a:p>
             <a:fld id="{AA309A6D-C09C-4548-B29A-6CF363A7E532}" type="datetimeFigureOut">
               <a:rPr lang="fr-FR" smtClean="0"/>
-              <a:t>15/11/2011</a:t>
+              <a:t>28/01/2014</a:t>
             </a:fld>
             <a:endParaRPr lang="fr-BE"/>
           </a:p>
@@ -797,7 +799,7 @@
           <a:p>
             <a:fld id="{AA309A6D-C09C-4548-B29A-6CF363A7E532}" type="datetimeFigureOut">
               <a:rPr lang="fr-FR" smtClean="0"/>
-              <a:t>15/11/2011</a:t>
+              <a:t>28/01/2014</a:t>
             </a:fld>
             <a:endParaRPr lang="fr-BE"/>
           </a:p>
@@ -1038,7 +1040,7 @@
           <a:p>
             <a:fld id="{AA309A6D-C09C-4548-B29A-6CF363A7E532}" type="datetimeFigureOut">
               <a:rPr lang="fr-FR" smtClean="0"/>
-              <a:t>15/11/2011</a:t>
+              <a:t>28/01/2014</a:t>
             </a:fld>
             <a:endParaRPr lang="fr-BE"/>
           </a:p>
@@ -1321,7 +1323,7 @@
           <a:p>
             <a:fld id="{AA309A6D-C09C-4548-B29A-6CF363A7E532}" type="datetimeFigureOut">
               <a:rPr lang="fr-FR" smtClean="0"/>
-              <a:t>15/11/2011</a:t>
+              <a:t>28/01/2014</a:t>
             </a:fld>
             <a:endParaRPr lang="fr-BE"/>
           </a:p>
@@ -1738,7 +1740,7 @@
           <a:p>
             <a:fld id="{AA309A6D-C09C-4548-B29A-6CF363A7E532}" type="datetimeFigureOut">
               <a:rPr lang="fr-FR" smtClean="0"/>
-              <a:t>15/11/2011</a:t>
+              <a:t>28/01/2014</a:t>
             </a:fld>
             <a:endParaRPr lang="fr-BE"/>
           </a:p>
@@ -1851,7 +1853,7 @@
           <a:p>
             <a:fld id="{AA309A6D-C09C-4548-B29A-6CF363A7E532}" type="datetimeFigureOut">
               <a:rPr lang="fr-FR" smtClean="0"/>
-              <a:t>15/11/2011</a:t>
+              <a:t>28/01/2014</a:t>
             </a:fld>
             <a:endParaRPr lang="fr-BE"/>
           </a:p>
@@ -1941,7 +1943,7 @@
           <a:p>
             <a:fld id="{AA309A6D-C09C-4548-B29A-6CF363A7E532}" type="datetimeFigureOut">
               <a:rPr lang="fr-FR" smtClean="0"/>
-              <a:t>15/11/2011</a:t>
+              <a:t>28/01/2014</a:t>
             </a:fld>
             <a:endParaRPr lang="fr-BE"/>
           </a:p>
@@ -2213,7 +2215,7 @@
           <a:p>
             <a:fld id="{AA309A6D-C09C-4548-B29A-6CF363A7E532}" type="datetimeFigureOut">
               <a:rPr lang="fr-FR" smtClean="0"/>
-              <a:t>15/11/2011</a:t>
+              <a:t>28/01/2014</a:t>
             </a:fld>
             <a:endParaRPr lang="fr-BE"/>
           </a:p>
@@ -2461,7 +2463,7 @@
           <a:p>
             <a:fld id="{AA309A6D-C09C-4548-B29A-6CF363A7E532}" type="datetimeFigureOut">
               <a:rPr lang="fr-FR" smtClean="0"/>
-              <a:t>15/11/2011</a:t>
+              <a:t>28/01/2014</a:t>
             </a:fld>
             <a:endParaRPr lang="fr-BE"/>
           </a:p>
@@ -2669,7 +2671,7 @@
           <a:p>
             <a:fld id="{AA309A6D-C09C-4548-B29A-6CF363A7E532}" type="datetimeFigureOut">
               <a:rPr lang="fr-FR" smtClean="0"/>
-              <a:t>15/11/2011</a:t>
+              <a:t>28/01/2014</a:t>
             </a:fld>
             <a:endParaRPr lang="fr-BE"/>
           </a:p>
@@ -3023,6 +3025,3262 @@
 </file>
 
 <file path=ppt/slides/slide1.xml><?xml version="1.0" encoding="utf-8"?>
+<p:sld xmlns:a="http://schemas.openxmlformats.org/drawingml/2006/main" xmlns:r="http://schemas.openxmlformats.org/officeDocument/2006/relationships" xmlns:p="http://schemas.openxmlformats.org/presentationml/2006/main">
+  <p:cSld>
+    <p:spTree>
+      <p:nvGrpSpPr>
+        <p:cNvPr id="1" name=""/>
+        <p:cNvGrpSpPr/>
+        <p:nvPr/>
+      </p:nvGrpSpPr>
+      <p:grpSpPr>
+        <a:xfrm>
+          <a:off x="0" y="0"/>
+          <a:ext cx="0" cy="0"/>
+          <a:chOff x="0" y="0"/>
+          <a:chExt cx="0" cy="0"/>
+        </a:xfrm>
+      </p:grpSpPr>
+      <mc:AlternateContent xmlns:mc="http://schemas.openxmlformats.org/markup-compatibility/2006">
+        <mc:Choice xmlns:a14="http://schemas.microsoft.com/office/drawing/2010/main" Requires="a14">
+          <p:sp>
+            <p:nvSpPr>
+              <p:cNvPr id="14" name="ZoneTexte 13"/>
+              <p:cNvSpPr txBox="1"/>
+              <p:nvPr/>
+            </p:nvSpPr>
+            <p:spPr>
+              <a:xfrm>
+                <a:off x="1547664" y="2391082"/>
+                <a:ext cx="370165" cy="276999"/>
+              </a:xfrm>
+              <a:prstGeom prst="rect">
+                <a:avLst/>
+              </a:prstGeom>
+              <a:noFill/>
+            </p:spPr>
+            <p:txBody>
+              <a:bodyPr wrap="none" rtlCol="0">
+                <a:spAutoFit/>
+              </a:bodyPr>
+              <a:lstStyle/>
+              <a:p>
+                <a14:m>
+                  <m:oMathPara xmlns:m="http://schemas.openxmlformats.org/officeDocument/2006/math">
+                    <m:oMathParaPr>
+                      <m:jc m:val="centerGroup"/>
+                    </m:oMathParaPr>
+                    <m:oMath xmlns:m="http://schemas.openxmlformats.org/officeDocument/2006/math">
+                      <m:sSub>
+                        <m:sSubPr>
+                          <m:ctrlPr>
+                            <a:rPr lang="fr-FR" sz="1200" b="0" i="1" smtClean="0">
+                              <a:latin typeface="Cambria Math"/>
+                            </a:rPr>
+                          </m:ctrlPr>
+                        </m:sSubPr>
+                        <m:e>
+                          <m:r>
+                            <a:rPr lang="fr-FR" sz="1200" b="0" i="1" smtClean="0">
+                              <a:latin typeface="Cambria Math"/>
+                            </a:rPr>
+                            <m:t>𝑝</m:t>
+                          </m:r>
+                        </m:e>
+                        <m:sub>
+                          <m:r>
+                            <a:rPr lang="fr-FR" sz="1200" b="0" i="1" smtClean="0">
+                              <a:latin typeface="Cambria Math"/>
+                            </a:rPr>
+                            <m:t>1</m:t>
+                          </m:r>
+                        </m:sub>
+                      </m:sSub>
+                    </m:oMath>
+                  </m:oMathPara>
+                </a14:m>
+                <a:endParaRPr lang="fr-FR" sz="1200" dirty="0"/>
+              </a:p>
+            </p:txBody>
+          </p:sp>
+        </mc:Choice>
+        <mc:Fallback>
+          <p:sp>
+            <p:nvSpPr>
+              <p:cNvPr id="14" name="ZoneTexte 13"/>
+              <p:cNvSpPr txBox="1">
+                <a:spLocks noRot="1" noChangeAspect="1" noMove="1" noResize="1" noEditPoints="1" noAdjustHandles="1" noChangeArrowheads="1" noChangeShapeType="1" noTextEdit="1"/>
+              </p:cNvSpPr>
+              <p:nvPr/>
+            </p:nvSpPr>
+            <p:spPr>
+              <a:xfrm>
+                <a:off x="1547664" y="2391082"/>
+                <a:ext cx="370165" cy="276999"/>
+              </a:xfrm>
+              <a:prstGeom prst="rect">
+                <a:avLst/>
+              </a:prstGeom>
+              <a:blipFill rotWithShape="1">
+                <a:blip r:embed="rId2"/>
+                <a:stretch>
+                  <a:fillRect/>
+                </a:stretch>
+              </a:blipFill>
+            </p:spPr>
+            <p:txBody>
+              <a:bodyPr/>
+              <a:lstStyle/>
+              <a:p>
+                <a:r>
+                  <a:rPr lang="fr-FR">
+                    <a:noFill/>
+                  </a:rPr>
+                  <a:t> </a:t>
+                </a:r>
+              </a:p>
+            </p:txBody>
+          </p:sp>
+        </mc:Fallback>
+      </mc:AlternateContent>
+      <mc:AlternateContent xmlns:mc="http://schemas.openxmlformats.org/markup-compatibility/2006">
+        <mc:Choice xmlns:a14="http://schemas.microsoft.com/office/drawing/2010/main" Requires="a14">
+          <p:sp>
+            <p:nvSpPr>
+              <p:cNvPr id="15" name="ZoneTexte 14"/>
+              <p:cNvSpPr txBox="1"/>
+              <p:nvPr/>
+            </p:nvSpPr>
+            <p:spPr>
+              <a:xfrm>
+                <a:off x="816309" y="2388674"/>
+                <a:ext cx="373756" cy="276999"/>
+              </a:xfrm>
+              <a:prstGeom prst="rect">
+                <a:avLst/>
+              </a:prstGeom>
+              <a:noFill/>
+            </p:spPr>
+            <p:txBody>
+              <a:bodyPr wrap="none" rtlCol="0">
+                <a:spAutoFit/>
+              </a:bodyPr>
+              <a:lstStyle/>
+              <a:p>
+                <a14:m>
+                  <m:oMathPara xmlns:m="http://schemas.openxmlformats.org/officeDocument/2006/math">
+                    <m:oMathParaPr>
+                      <m:jc m:val="centerGroup"/>
+                    </m:oMathParaPr>
+                    <m:oMath xmlns:m="http://schemas.openxmlformats.org/officeDocument/2006/math">
+                      <m:sSub>
+                        <m:sSubPr>
+                          <m:ctrlPr>
+                            <a:rPr lang="fr-FR" sz="1200" b="0" i="1" smtClean="0">
+                              <a:latin typeface="Cambria Math"/>
+                            </a:rPr>
+                          </m:ctrlPr>
+                        </m:sSubPr>
+                        <m:e>
+                          <m:r>
+                            <a:rPr lang="fr-FR" sz="1200" b="0" i="1" smtClean="0">
+                              <a:latin typeface="Cambria Math"/>
+                            </a:rPr>
+                            <m:t>𝑝</m:t>
+                          </m:r>
+                        </m:e>
+                        <m:sub>
+                          <m:r>
+                            <a:rPr lang="fr-FR" sz="1200" b="0" i="1" smtClean="0">
+                              <a:latin typeface="Cambria Math"/>
+                            </a:rPr>
+                            <m:t>2</m:t>
+                          </m:r>
+                        </m:sub>
+                      </m:sSub>
+                    </m:oMath>
+                  </m:oMathPara>
+                </a14:m>
+                <a:endParaRPr lang="fr-FR" sz="1200" dirty="0"/>
+              </a:p>
+            </p:txBody>
+          </p:sp>
+        </mc:Choice>
+        <mc:Fallback>
+          <p:sp>
+            <p:nvSpPr>
+              <p:cNvPr id="15" name="ZoneTexte 14"/>
+              <p:cNvSpPr txBox="1">
+                <a:spLocks noRot="1" noChangeAspect="1" noMove="1" noResize="1" noEditPoints="1" noAdjustHandles="1" noChangeArrowheads="1" noChangeShapeType="1" noTextEdit="1"/>
+              </p:cNvSpPr>
+              <p:nvPr/>
+            </p:nvSpPr>
+            <p:spPr>
+              <a:xfrm>
+                <a:off x="816309" y="2388674"/>
+                <a:ext cx="373756" cy="276999"/>
+              </a:xfrm>
+              <a:prstGeom prst="rect">
+                <a:avLst/>
+              </a:prstGeom>
+              <a:blipFill rotWithShape="1">
+                <a:blip r:embed="rId3"/>
+                <a:stretch>
+                  <a:fillRect/>
+                </a:stretch>
+              </a:blipFill>
+            </p:spPr>
+            <p:txBody>
+              <a:bodyPr/>
+              <a:lstStyle/>
+              <a:p>
+                <a:r>
+                  <a:rPr lang="fr-FR">
+                    <a:noFill/>
+                  </a:rPr>
+                  <a:t> </a:t>
+                </a:r>
+              </a:p>
+            </p:txBody>
+          </p:sp>
+        </mc:Fallback>
+      </mc:AlternateContent>
+      <p:pic>
+        <p:nvPicPr>
+          <p:cNvPr id="1029" name="Picture 5" descr="C:\Enseignements\GitHub\CI_02_EtudeSLCI\6_SystemesAsservis\Cours\png\poles_2_4.png"/>
+          <p:cNvPicPr>
+            <a:picLocks noChangeAspect="1" noChangeArrowheads="1"/>
+          </p:cNvPicPr>
+          <p:nvPr/>
+        </p:nvPicPr>
+        <p:blipFill>
+          <a:blip r:embed="rId4" cstate="print">
+            <a:extLst>
+              <a:ext uri="{28A0092B-C50C-407E-A947-70E740481C1C}">
+                <a14:useLocalDpi xmlns:a14="http://schemas.microsoft.com/office/drawing/2010/main" val="0"/>
+              </a:ext>
+            </a:extLst>
+          </a:blip>
+          <a:srcRect/>
+          <a:stretch>
+            <a:fillRect/>
+          </a:stretch>
+        </p:blipFill>
+        <p:spPr bwMode="auto">
+          <a:xfrm>
+            <a:off x="2620214" y="416250"/>
+            <a:ext cx="2385432" cy="1800000"/>
+          </a:xfrm>
+          <a:prstGeom prst="rect">
+            <a:avLst/>
+          </a:prstGeom>
+          <a:noFill/>
+          <a:extLst>
+            <a:ext uri="{909E8E84-426E-40DD-AFC4-6F175D3DCCD1}">
+              <a14:hiddenFill xmlns:a14="http://schemas.microsoft.com/office/drawing/2010/main">
+                <a:solidFill>
+                  <a:srgbClr val="FFFFFF"/>
+                </a:solidFill>
+              </a14:hiddenFill>
+            </a:ext>
+          </a:extLst>
+        </p:spPr>
+      </p:pic>
+      <p:pic>
+        <p:nvPicPr>
+          <p:cNvPr id="1027" name="Picture 3" descr="C:\Enseignements\GitHub\CI_02_EtudeSLCI\6_SystemesAsservis\Cours\png\poles_2_2.png"/>
+          <p:cNvPicPr>
+            <a:picLocks noChangeAspect="1" noChangeArrowheads="1"/>
+          </p:cNvPicPr>
+          <p:nvPr/>
+        </p:nvPicPr>
+        <p:blipFill>
+          <a:blip r:embed="rId5" cstate="print">
+            <a:extLst>
+              <a:ext uri="{28A0092B-C50C-407E-A947-70E740481C1C}">
+                <a14:useLocalDpi xmlns:a14="http://schemas.microsoft.com/office/drawing/2010/main" val="0"/>
+              </a:ext>
+            </a:extLst>
+          </a:blip>
+          <a:srcRect/>
+          <a:stretch>
+            <a:fillRect/>
+          </a:stretch>
+        </p:blipFill>
+        <p:spPr bwMode="auto">
+          <a:xfrm>
+            <a:off x="-189529" y="2996952"/>
+            <a:ext cx="2385432" cy="1800000"/>
+          </a:xfrm>
+          <a:prstGeom prst="rect">
+            <a:avLst/>
+          </a:prstGeom>
+          <a:noFill/>
+          <a:extLst>
+            <a:ext uri="{909E8E84-426E-40DD-AFC4-6F175D3DCCD1}">
+              <a14:hiddenFill xmlns:a14="http://schemas.microsoft.com/office/drawing/2010/main">
+                <a:solidFill>
+                  <a:srgbClr val="FFFFFF"/>
+                </a:solidFill>
+              </a14:hiddenFill>
+            </a:ext>
+          </a:extLst>
+        </p:spPr>
+      </p:pic>
+      <p:pic>
+        <p:nvPicPr>
+          <p:cNvPr id="1028" name="Picture 4" descr="C:\Enseignements\GitHub\CI_02_EtudeSLCI\6_SystemesAsservis\Cours\png\poles_2_3.png"/>
+          <p:cNvPicPr>
+            <a:picLocks noChangeAspect="1" noChangeArrowheads="1"/>
+          </p:cNvPicPr>
+          <p:nvPr/>
+        </p:nvPicPr>
+        <p:blipFill>
+          <a:blip r:embed="rId6" cstate="print">
+            <a:extLst>
+              <a:ext uri="{28A0092B-C50C-407E-A947-70E740481C1C}">
+                <a14:useLocalDpi xmlns:a14="http://schemas.microsoft.com/office/drawing/2010/main" val="0"/>
+              </a:ext>
+            </a:extLst>
+          </a:blip>
+          <a:srcRect/>
+          <a:stretch>
+            <a:fillRect/>
+          </a:stretch>
+        </p:blipFill>
+        <p:spPr bwMode="auto">
+          <a:xfrm>
+            <a:off x="2620214" y="2996952"/>
+            <a:ext cx="2385432" cy="1800000"/>
+          </a:xfrm>
+          <a:prstGeom prst="rect">
+            <a:avLst/>
+          </a:prstGeom>
+          <a:noFill/>
+          <a:extLst>
+            <a:ext uri="{909E8E84-426E-40DD-AFC4-6F175D3DCCD1}">
+              <a14:hiddenFill xmlns:a14="http://schemas.microsoft.com/office/drawing/2010/main">
+                <a:solidFill>
+                  <a:srgbClr val="FFFFFF"/>
+                </a:solidFill>
+              </a14:hiddenFill>
+            </a:ext>
+          </a:extLst>
+        </p:spPr>
+      </p:pic>
+      <p:pic>
+        <p:nvPicPr>
+          <p:cNvPr id="38" name="Picture 2" descr="C:\Enseignements\GitHub\CI_02_EtudeSLCI\6_SystemesAsservis\Cours\png\poles_2_1.png"/>
+          <p:cNvPicPr>
+            <a:picLocks noChangeAspect="1" noChangeArrowheads="1"/>
+          </p:cNvPicPr>
+          <p:nvPr/>
+        </p:nvPicPr>
+        <p:blipFill>
+          <a:blip r:embed="rId7" cstate="print">
+            <a:extLst>
+              <a:ext uri="{28A0092B-C50C-407E-A947-70E740481C1C}">
+                <a14:useLocalDpi xmlns:a14="http://schemas.microsoft.com/office/drawing/2010/main" val="0"/>
+              </a:ext>
+            </a:extLst>
+          </a:blip>
+          <a:srcRect/>
+          <a:stretch>
+            <a:fillRect/>
+          </a:stretch>
+        </p:blipFill>
+        <p:spPr bwMode="auto">
+          <a:xfrm>
+            <a:off x="-180937" y="416250"/>
+            <a:ext cx="2385433" cy="1800000"/>
+          </a:xfrm>
+          <a:prstGeom prst="rect">
+            <a:avLst/>
+          </a:prstGeom>
+          <a:noFill/>
+          <a:extLst>
+            <a:ext uri="{909E8E84-426E-40DD-AFC4-6F175D3DCCD1}">
+              <a14:hiddenFill xmlns:a14="http://schemas.microsoft.com/office/drawing/2010/main">
+                <a:solidFill>
+                  <a:srgbClr val="FFFFFF"/>
+                </a:solidFill>
+              </a14:hiddenFill>
+            </a:ext>
+          </a:extLst>
+        </p:spPr>
+      </p:pic>
+      <p:cxnSp>
+        <p:nvCxnSpPr>
+          <p:cNvPr id="6" name="Connecteur droit avec flèche 5"/>
+          <p:cNvCxnSpPr/>
+          <p:nvPr/>
+        </p:nvCxnSpPr>
+        <p:spPr>
+          <a:xfrm flipV="1">
+            <a:off x="2411760" y="1892293"/>
+            <a:ext cx="0" cy="1512168"/>
+          </a:xfrm>
+          <a:prstGeom prst="straightConnector1">
+            <a:avLst/>
+          </a:prstGeom>
+          <a:ln w="19050">
+            <a:solidFill>
+              <a:schemeClr val="tx2"/>
+            </a:solidFill>
+            <a:tailEnd type="stealth" w="med" len="lg"/>
+          </a:ln>
+        </p:spPr>
+        <p:style>
+          <a:lnRef idx="1">
+            <a:schemeClr val="accent1"/>
+          </a:lnRef>
+          <a:fillRef idx="0">
+            <a:schemeClr val="accent1"/>
+          </a:fillRef>
+          <a:effectRef idx="0">
+            <a:schemeClr val="accent1"/>
+          </a:effectRef>
+          <a:fontRef idx="minor">
+            <a:schemeClr val="tx1"/>
+          </a:fontRef>
+        </p:style>
+      </p:cxnSp>
+      <p:cxnSp>
+        <p:nvCxnSpPr>
+          <p:cNvPr id="7" name="Connecteur droit avec flèche 6"/>
+          <p:cNvCxnSpPr/>
+          <p:nvPr/>
+        </p:nvCxnSpPr>
+        <p:spPr>
+          <a:xfrm flipV="1">
+            <a:off x="251520" y="2720385"/>
+            <a:ext cx="3600400" cy="1"/>
+          </a:xfrm>
+          <a:prstGeom prst="straightConnector1">
+            <a:avLst/>
+          </a:prstGeom>
+          <a:ln w="19050">
+            <a:solidFill>
+              <a:schemeClr val="tx2"/>
+            </a:solidFill>
+            <a:tailEnd type="stealth" w="med" len="lg"/>
+          </a:ln>
+        </p:spPr>
+        <p:style>
+          <a:lnRef idx="1">
+            <a:schemeClr val="accent1"/>
+          </a:lnRef>
+          <a:fillRef idx="0">
+            <a:schemeClr val="accent1"/>
+          </a:fillRef>
+          <a:effectRef idx="0">
+            <a:schemeClr val="accent1"/>
+          </a:effectRef>
+          <a:fontRef idx="minor">
+            <a:schemeClr val="tx1"/>
+          </a:fontRef>
+        </p:style>
+      </p:cxnSp>
+      <mc:AlternateContent xmlns:mc="http://schemas.openxmlformats.org/markup-compatibility/2006">
+        <mc:Choice xmlns:a14="http://schemas.microsoft.com/office/drawing/2010/main" Requires="a14">
+          <p:sp>
+            <p:nvSpPr>
+              <p:cNvPr id="10" name="ZoneTexte 9"/>
+              <p:cNvSpPr txBox="1"/>
+              <p:nvPr/>
+            </p:nvSpPr>
+            <p:spPr>
+              <a:xfrm>
+                <a:off x="2017340" y="1844824"/>
+                <a:ext cx="445827" cy="307777"/>
+              </a:xfrm>
+              <a:prstGeom prst="rect">
+                <a:avLst/>
+              </a:prstGeom>
+              <a:noFill/>
+            </p:spPr>
+            <p:txBody>
+              <a:bodyPr wrap="none" rtlCol="0">
+                <a:spAutoFit/>
+              </a:bodyPr>
+              <a:lstStyle/>
+              <a:p>
+                <a14:m>
+                  <m:oMathPara xmlns:m="http://schemas.openxmlformats.org/officeDocument/2006/math">
+                    <m:oMathParaPr>
+                      <m:jc m:val="centerGroup"/>
+                    </m:oMathParaPr>
+                    <m:oMath xmlns:m="http://schemas.openxmlformats.org/officeDocument/2006/math">
+                      <m:r>
+                        <a:rPr lang="fr-FR" sz="1400" b="0" i="1" smtClean="0">
+                          <a:latin typeface="Cambria Math"/>
+                        </a:rPr>
+                        <m:t>𝐼𝑚</m:t>
+                      </m:r>
+                    </m:oMath>
+                  </m:oMathPara>
+                </a14:m>
+                <a:endParaRPr lang="fr-FR" sz="1400" dirty="0"/>
+              </a:p>
+            </p:txBody>
+          </p:sp>
+        </mc:Choice>
+        <mc:Fallback>
+          <p:sp>
+            <p:nvSpPr>
+              <p:cNvPr id="10" name="ZoneTexte 9"/>
+              <p:cNvSpPr txBox="1">
+                <a:spLocks noRot="1" noChangeAspect="1" noMove="1" noResize="1" noEditPoints="1" noAdjustHandles="1" noChangeArrowheads="1" noChangeShapeType="1" noTextEdit="1"/>
+              </p:cNvSpPr>
+              <p:nvPr/>
+            </p:nvSpPr>
+            <p:spPr>
+              <a:xfrm>
+                <a:off x="2017340" y="1844824"/>
+                <a:ext cx="445827" cy="307777"/>
+              </a:xfrm>
+              <a:prstGeom prst="rect">
+                <a:avLst/>
+              </a:prstGeom>
+              <a:blipFill rotWithShape="1">
+                <a:blip r:embed="rId8"/>
+                <a:stretch>
+                  <a:fillRect/>
+                </a:stretch>
+              </a:blipFill>
+            </p:spPr>
+            <p:txBody>
+              <a:bodyPr/>
+              <a:lstStyle/>
+              <a:p>
+                <a:r>
+                  <a:rPr lang="fr-FR">
+                    <a:noFill/>
+                  </a:rPr>
+                  <a:t> </a:t>
+                </a:r>
+              </a:p>
+            </p:txBody>
+          </p:sp>
+        </mc:Fallback>
+      </mc:AlternateContent>
+      <mc:AlternateContent xmlns:mc="http://schemas.openxmlformats.org/markup-compatibility/2006">
+        <mc:Choice xmlns:a14="http://schemas.microsoft.com/office/drawing/2010/main" Requires="a14">
+          <p:sp>
+            <p:nvSpPr>
+              <p:cNvPr id="11" name="ZoneTexte 10"/>
+              <p:cNvSpPr txBox="1"/>
+              <p:nvPr/>
+            </p:nvSpPr>
+            <p:spPr>
+              <a:xfrm>
+                <a:off x="3851920" y="2562566"/>
+                <a:ext cx="432298" cy="307777"/>
+              </a:xfrm>
+              <a:prstGeom prst="rect">
+                <a:avLst/>
+              </a:prstGeom>
+              <a:noFill/>
+            </p:spPr>
+            <p:txBody>
+              <a:bodyPr wrap="none" rtlCol="0">
+                <a:spAutoFit/>
+              </a:bodyPr>
+              <a:lstStyle/>
+              <a:p>
+                <a14:m>
+                  <m:oMathPara xmlns:m="http://schemas.openxmlformats.org/officeDocument/2006/math">
+                    <m:oMathParaPr>
+                      <m:jc m:val="centerGroup"/>
+                    </m:oMathParaPr>
+                    <m:oMath xmlns:m="http://schemas.openxmlformats.org/officeDocument/2006/math">
+                      <m:r>
+                        <a:rPr lang="fr-FR" sz="1400" b="0" i="1" smtClean="0">
+                          <a:latin typeface="Cambria Math"/>
+                        </a:rPr>
+                        <m:t>𝑅𝑒</m:t>
+                      </m:r>
+                    </m:oMath>
+                  </m:oMathPara>
+                </a14:m>
+                <a:endParaRPr lang="fr-FR" sz="1400" dirty="0"/>
+              </a:p>
+            </p:txBody>
+          </p:sp>
+        </mc:Choice>
+        <mc:Fallback>
+          <p:sp>
+            <p:nvSpPr>
+              <p:cNvPr id="11" name="ZoneTexte 10"/>
+              <p:cNvSpPr txBox="1">
+                <a:spLocks noRot="1" noChangeAspect="1" noMove="1" noResize="1" noEditPoints="1" noAdjustHandles="1" noChangeArrowheads="1" noChangeShapeType="1" noTextEdit="1"/>
+              </p:cNvSpPr>
+              <p:nvPr/>
+            </p:nvSpPr>
+            <p:spPr>
+              <a:xfrm>
+                <a:off x="3851920" y="2562566"/>
+                <a:ext cx="432298" cy="307777"/>
+              </a:xfrm>
+              <a:prstGeom prst="rect">
+                <a:avLst/>
+              </a:prstGeom>
+              <a:blipFill rotWithShape="1">
+                <a:blip r:embed="rId9"/>
+                <a:stretch>
+                  <a:fillRect/>
+                </a:stretch>
+              </a:blipFill>
+            </p:spPr>
+            <p:txBody>
+              <a:bodyPr/>
+              <a:lstStyle/>
+              <a:p>
+                <a:r>
+                  <a:rPr lang="fr-FR">
+                    <a:noFill/>
+                  </a:rPr>
+                  <a:t> </a:t>
+                </a:r>
+              </a:p>
+            </p:txBody>
+          </p:sp>
+        </mc:Fallback>
+      </mc:AlternateContent>
+      <p:sp>
+        <p:nvSpPr>
+          <p:cNvPr id="12" name="Ellipse 11"/>
+          <p:cNvSpPr/>
+          <p:nvPr/>
+        </p:nvSpPr>
+        <p:spPr>
+          <a:xfrm>
+            <a:off x="1612596" y="2684382"/>
+            <a:ext cx="72008" cy="72008"/>
+          </a:xfrm>
+          <a:prstGeom prst="ellipse">
+            <a:avLst/>
+          </a:prstGeom>
+          <a:solidFill>
+            <a:schemeClr val="bg1"/>
+          </a:solidFill>
+          <a:ln w="12700">
+            <a:solidFill>
+              <a:srgbClr val="00B050"/>
+            </a:solidFill>
+          </a:ln>
+        </p:spPr>
+        <p:style>
+          <a:lnRef idx="2">
+            <a:schemeClr val="accent1">
+              <a:shade val="50000"/>
+            </a:schemeClr>
+          </a:lnRef>
+          <a:fillRef idx="1">
+            <a:schemeClr val="accent1"/>
+          </a:fillRef>
+          <a:effectRef idx="0">
+            <a:schemeClr val="accent1"/>
+          </a:effectRef>
+          <a:fontRef idx="minor">
+            <a:schemeClr val="lt1"/>
+          </a:fontRef>
+        </p:style>
+        <p:txBody>
+          <a:bodyPr rtlCol="0" anchor="ctr"/>
+          <a:lstStyle/>
+          <a:p>
+            <a:pPr algn="ctr"/>
+            <a:endParaRPr lang="fr-FR"/>
+          </a:p>
+        </p:txBody>
+      </p:sp>
+      <p:sp>
+        <p:nvSpPr>
+          <p:cNvPr id="13" name="Ellipse 12"/>
+          <p:cNvSpPr/>
+          <p:nvPr/>
+        </p:nvSpPr>
+        <p:spPr>
+          <a:xfrm>
+            <a:off x="1050466" y="2680451"/>
+            <a:ext cx="72008" cy="72008"/>
+          </a:xfrm>
+          <a:prstGeom prst="ellipse">
+            <a:avLst/>
+          </a:prstGeom>
+          <a:solidFill>
+            <a:schemeClr val="bg1"/>
+          </a:solidFill>
+          <a:ln w="12700">
+            <a:solidFill>
+              <a:srgbClr val="00B050"/>
+            </a:solidFill>
+          </a:ln>
+        </p:spPr>
+        <p:style>
+          <a:lnRef idx="2">
+            <a:schemeClr val="accent1">
+              <a:shade val="50000"/>
+            </a:schemeClr>
+          </a:lnRef>
+          <a:fillRef idx="1">
+            <a:schemeClr val="accent1"/>
+          </a:fillRef>
+          <a:effectRef idx="0">
+            <a:schemeClr val="accent1"/>
+          </a:effectRef>
+          <a:fontRef idx="minor">
+            <a:schemeClr val="lt1"/>
+          </a:fontRef>
+        </p:style>
+        <p:txBody>
+          <a:bodyPr rtlCol="0" anchor="ctr"/>
+          <a:lstStyle/>
+          <a:p>
+            <a:pPr algn="ctr"/>
+            <a:endParaRPr lang="fr-FR"/>
+          </a:p>
+        </p:txBody>
+      </p:sp>
+      <p:sp>
+        <p:nvSpPr>
+          <p:cNvPr id="20" name="Ellipse 19"/>
+          <p:cNvSpPr/>
+          <p:nvPr/>
+        </p:nvSpPr>
+        <p:spPr>
+          <a:xfrm>
+            <a:off x="3497550" y="2679595"/>
+            <a:ext cx="72008" cy="72008"/>
+          </a:xfrm>
+          <a:prstGeom prst="ellipse">
+            <a:avLst/>
+          </a:prstGeom>
+          <a:solidFill>
+            <a:schemeClr val="bg1"/>
+          </a:solidFill>
+          <a:ln w="12700">
+            <a:solidFill>
+              <a:srgbClr val="FF0000"/>
+            </a:solidFill>
+          </a:ln>
+        </p:spPr>
+        <p:style>
+          <a:lnRef idx="2">
+            <a:schemeClr val="accent1">
+              <a:shade val="50000"/>
+            </a:schemeClr>
+          </a:lnRef>
+          <a:fillRef idx="1">
+            <a:schemeClr val="accent1"/>
+          </a:fillRef>
+          <a:effectRef idx="0">
+            <a:schemeClr val="accent1"/>
+          </a:effectRef>
+          <a:fontRef idx="minor">
+            <a:schemeClr val="lt1"/>
+          </a:fontRef>
+        </p:style>
+        <p:txBody>
+          <a:bodyPr rtlCol="0" anchor="ctr"/>
+          <a:lstStyle/>
+          <a:p>
+            <a:pPr algn="ctr"/>
+            <a:endParaRPr lang="fr-FR"/>
+          </a:p>
+        </p:txBody>
+      </p:sp>
+      <p:sp>
+        <p:nvSpPr>
+          <p:cNvPr id="21" name="Ellipse 20"/>
+          <p:cNvSpPr/>
+          <p:nvPr/>
+        </p:nvSpPr>
+        <p:spPr>
+          <a:xfrm>
+            <a:off x="2935420" y="2684382"/>
+            <a:ext cx="72008" cy="72008"/>
+          </a:xfrm>
+          <a:prstGeom prst="ellipse">
+            <a:avLst/>
+          </a:prstGeom>
+          <a:solidFill>
+            <a:schemeClr val="bg1"/>
+          </a:solidFill>
+          <a:ln w="12700">
+            <a:solidFill>
+              <a:srgbClr val="FF0000"/>
+            </a:solidFill>
+          </a:ln>
+        </p:spPr>
+        <p:style>
+          <a:lnRef idx="2">
+            <a:schemeClr val="accent1">
+              <a:shade val="50000"/>
+            </a:schemeClr>
+          </a:lnRef>
+          <a:fillRef idx="1">
+            <a:schemeClr val="accent1"/>
+          </a:fillRef>
+          <a:effectRef idx="0">
+            <a:schemeClr val="accent1"/>
+          </a:effectRef>
+          <a:fontRef idx="minor">
+            <a:schemeClr val="lt1"/>
+          </a:fontRef>
+        </p:style>
+        <p:txBody>
+          <a:bodyPr rtlCol="0" anchor="ctr"/>
+          <a:lstStyle/>
+          <a:p>
+            <a:pPr algn="ctr"/>
+            <a:endParaRPr lang="fr-FR"/>
+          </a:p>
+        </p:txBody>
+      </p:sp>
+      <mc:AlternateContent xmlns:mc="http://schemas.openxmlformats.org/markup-compatibility/2006">
+        <mc:Choice xmlns:a14="http://schemas.microsoft.com/office/drawing/2010/main" Requires="a14">
+          <p:sp>
+            <p:nvSpPr>
+              <p:cNvPr id="22" name="ZoneTexte 21"/>
+              <p:cNvSpPr txBox="1"/>
+              <p:nvPr/>
+            </p:nvSpPr>
+            <p:spPr>
+              <a:xfrm>
+                <a:off x="3347864" y="2385265"/>
+                <a:ext cx="370165" cy="276999"/>
+              </a:xfrm>
+              <a:prstGeom prst="rect">
+                <a:avLst/>
+              </a:prstGeom>
+              <a:noFill/>
+            </p:spPr>
+            <p:txBody>
+              <a:bodyPr wrap="none" rtlCol="0">
+                <a:spAutoFit/>
+              </a:bodyPr>
+              <a:lstStyle/>
+              <a:p>
+                <a14:m>
+                  <m:oMathPara xmlns:m="http://schemas.openxmlformats.org/officeDocument/2006/math">
+                    <m:oMathParaPr>
+                      <m:jc m:val="centerGroup"/>
+                    </m:oMathParaPr>
+                    <m:oMath xmlns:m="http://schemas.openxmlformats.org/officeDocument/2006/math">
+                      <m:sSub>
+                        <m:sSubPr>
+                          <m:ctrlPr>
+                            <a:rPr lang="fr-FR" sz="1200" b="0" i="1" smtClean="0">
+                              <a:latin typeface="Cambria Math"/>
+                            </a:rPr>
+                          </m:ctrlPr>
+                        </m:sSubPr>
+                        <m:e>
+                          <m:r>
+                            <a:rPr lang="fr-FR" sz="1200" b="0" i="1" smtClean="0">
+                              <a:latin typeface="Cambria Math"/>
+                            </a:rPr>
+                            <m:t>𝑝</m:t>
+                          </m:r>
+                        </m:e>
+                        <m:sub>
+                          <m:r>
+                            <a:rPr lang="fr-FR" sz="1200" b="0" i="1" smtClean="0">
+                              <a:latin typeface="Cambria Math"/>
+                            </a:rPr>
+                            <m:t>1</m:t>
+                          </m:r>
+                        </m:sub>
+                      </m:sSub>
+                    </m:oMath>
+                  </m:oMathPara>
+                </a14:m>
+                <a:endParaRPr lang="fr-FR" sz="1200" dirty="0"/>
+              </a:p>
+            </p:txBody>
+          </p:sp>
+        </mc:Choice>
+        <mc:Fallback>
+          <p:sp>
+            <p:nvSpPr>
+              <p:cNvPr id="22" name="ZoneTexte 21"/>
+              <p:cNvSpPr txBox="1">
+                <a:spLocks noRot="1" noChangeAspect="1" noMove="1" noResize="1" noEditPoints="1" noAdjustHandles="1" noChangeArrowheads="1" noChangeShapeType="1" noTextEdit="1"/>
+              </p:cNvSpPr>
+              <p:nvPr/>
+            </p:nvSpPr>
+            <p:spPr>
+              <a:xfrm>
+                <a:off x="3347864" y="2385265"/>
+                <a:ext cx="370165" cy="276999"/>
+              </a:xfrm>
+              <a:prstGeom prst="rect">
+                <a:avLst/>
+              </a:prstGeom>
+              <a:blipFill rotWithShape="1">
+                <a:blip r:embed="rId2"/>
+                <a:stretch>
+                  <a:fillRect/>
+                </a:stretch>
+              </a:blipFill>
+            </p:spPr>
+            <p:txBody>
+              <a:bodyPr/>
+              <a:lstStyle/>
+              <a:p>
+                <a:r>
+                  <a:rPr lang="fr-FR">
+                    <a:noFill/>
+                  </a:rPr>
+                  <a:t> </a:t>
+                </a:r>
+              </a:p>
+            </p:txBody>
+          </p:sp>
+        </mc:Fallback>
+      </mc:AlternateContent>
+      <mc:AlternateContent xmlns:mc="http://schemas.openxmlformats.org/markup-compatibility/2006">
+        <mc:Choice xmlns:a14="http://schemas.microsoft.com/office/drawing/2010/main" Requires="a14">
+          <p:sp>
+            <p:nvSpPr>
+              <p:cNvPr id="23" name="ZoneTexte 22"/>
+              <p:cNvSpPr txBox="1"/>
+              <p:nvPr/>
+            </p:nvSpPr>
+            <p:spPr>
+              <a:xfrm>
+                <a:off x="2784546" y="2385265"/>
+                <a:ext cx="373756" cy="276999"/>
+              </a:xfrm>
+              <a:prstGeom prst="rect">
+                <a:avLst/>
+              </a:prstGeom>
+              <a:noFill/>
+            </p:spPr>
+            <p:txBody>
+              <a:bodyPr wrap="none" rtlCol="0">
+                <a:spAutoFit/>
+              </a:bodyPr>
+              <a:lstStyle/>
+              <a:p>
+                <a14:m>
+                  <m:oMathPara xmlns:m="http://schemas.openxmlformats.org/officeDocument/2006/math">
+                    <m:oMathParaPr>
+                      <m:jc m:val="centerGroup"/>
+                    </m:oMathParaPr>
+                    <m:oMath xmlns:m="http://schemas.openxmlformats.org/officeDocument/2006/math">
+                      <m:sSub>
+                        <m:sSubPr>
+                          <m:ctrlPr>
+                            <a:rPr lang="fr-FR" sz="1200" b="0" i="1" smtClean="0">
+                              <a:latin typeface="Cambria Math"/>
+                            </a:rPr>
+                          </m:ctrlPr>
+                        </m:sSubPr>
+                        <m:e>
+                          <m:r>
+                            <a:rPr lang="fr-FR" sz="1200" b="0" i="1" smtClean="0">
+                              <a:latin typeface="Cambria Math"/>
+                            </a:rPr>
+                            <m:t>𝑝</m:t>
+                          </m:r>
+                        </m:e>
+                        <m:sub>
+                          <m:r>
+                            <a:rPr lang="fr-FR" sz="1200" b="0" i="1" smtClean="0">
+                              <a:latin typeface="Cambria Math"/>
+                            </a:rPr>
+                            <m:t>2</m:t>
+                          </m:r>
+                        </m:sub>
+                      </m:sSub>
+                    </m:oMath>
+                  </m:oMathPara>
+                </a14:m>
+                <a:endParaRPr lang="fr-FR" sz="1200" dirty="0"/>
+              </a:p>
+            </p:txBody>
+          </p:sp>
+        </mc:Choice>
+        <mc:Fallback>
+          <p:sp>
+            <p:nvSpPr>
+              <p:cNvPr id="23" name="ZoneTexte 22"/>
+              <p:cNvSpPr txBox="1">
+                <a:spLocks noRot="1" noChangeAspect="1" noMove="1" noResize="1" noEditPoints="1" noAdjustHandles="1" noChangeArrowheads="1" noChangeShapeType="1" noTextEdit="1"/>
+              </p:cNvSpPr>
+              <p:nvPr/>
+            </p:nvSpPr>
+            <p:spPr>
+              <a:xfrm>
+                <a:off x="2784546" y="2385265"/>
+                <a:ext cx="373756" cy="276999"/>
+              </a:xfrm>
+              <a:prstGeom prst="rect">
+                <a:avLst/>
+              </a:prstGeom>
+              <a:blipFill rotWithShape="1">
+                <a:blip r:embed="rId10"/>
+                <a:stretch>
+                  <a:fillRect/>
+                </a:stretch>
+              </a:blipFill>
+            </p:spPr>
+            <p:txBody>
+              <a:bodyPr/>
+              <a:lstStyle/>
+              <a:p>
+                <a:r>
+                  <a:rPr lang="fr-FR">
+                    <a:noFill/>
+                  </a:rPr>
+                  <a:t> </a:t>
+                </a:r>
+              </a:p>
+            </p:txBody>
+          </p:sp>
+        </mc:Fallback>
+      </mc:AlternateContent>
+      <p:sp>
+        <p:nvSpPr>
+          <p:cNvPr id="26" name="Ellipse 25"/>
+          <p:cNvSpPr/>
+          <p:nvPr/>
+        </p:nvSpPr>
+        <p:spPr>
+          <a:xfrm>
+            <a:off x="2548206" y="2679595"/>
+            <a:ext cx="72008" cy="72008"/>
+          </a:xfrm>
+          <a:prstGeom prst="ellipse">
+            <a:avLst/>
+          </a:prstGeom>
+          <a:solidFill>
+            <a:schemeClr val="bg1"/>
+          </a:solidFill>
+          <a:ln w="12700">
+            <a:solidFill>
+              <a:srgbClr val="7030A0"/>
+            </a:solidFill>
+          </a:ln>
+        </p:spPr>
+        <p:style>
+          <a:lnRef idx="2">
+            <a:schemeClr val="accent1">
+              <a:shade val="50000"/>
+            </a:schemeClr>
+          </a:lnRef>
+          <a:fillRef idx="1">
+            <a:schemeClr val="accent1"/>
+          </a:fillRef>
+          <a:effectRef idx="0">
+            <a:schemeClr val="accent1"/>
+          </a:effectRef>
+          <a:fontRef idx="minor">
+            <a:schemeClr val="lt1"/>
+          </a:fontRef>
+        </p:style>
+        <p:txBody>
+          <a:bodyPr rtlCol="0" anchor="ctr"/>
+          <a:lstStyle/>
+          <a:p>
+            <a:pPr algn="ctr"/>
+            <a:endParaRPr lang="fr-FR"/>
+          </a:p>
+        </p:txBody>
+      </p:sp>
+      <p:sp>
+        <p:nvSpPr>
+          <p:cNvPr id="27" name="Ellipse 26"/>
+          <p:cNvSpPr/>
+          <p:nvPr/>
+        </p:nvSpPr>
+        <p:spPr>
+          <a:xfrm>
+            <a:off x="2195736" y="2680451"/>
+            <a:ext cx="72008" cy="72008"/>
+          </a:xfrm>
+          <a:prstGeom prst="ellipse">
+            <a:avLst/>
+          </a:prstGeom>
+          <a:solidFill>
+            <a:schemeClr val="bg1"/>
+          </a:solidFill>
+          <a:ln w="12700">
+            <a:solidFill>
+              <a:srgbClr val="7030A0"/>
+            </a:solidFill>
+          </a:ln>
+        </p:spPr>
+        <p:style>
+          <a:lnRef idx="2">
+            <a:schemeClr val="accent1">
+              <a:shade val="50000"/>
+            </a:schemeClr>
+          </a:lnRef>
+          <a:fillRef idx="1">
+            <a:schemeClr val="accent1"/>
+          </a:fillRef>
+          <a:effectRef idx="0">
+            <a:schemeClr val="accent1"/>
+          </a:effectRef>
+          <a:fontRef idx="minor">
+            <a:schemeClr val="lt1"/>
+          </a:fontRef>
+        </p:style>
+        <p:txBody>
+          <a:bodyPr rtlCol="0" anchor="ctr"/>
+          <a:lstStyle/>
+          <a:p>
+            <a:pPr algn="ctr"/>
+            <a:endParaRPr lang="fr-FR"/>
+          </a:p>
+        </p:txBody>
+      </p:sp>
+      <mc:AlternateContent xmlns:mc="http://schemas.openxmlformats.org/markup-compatibility/2006">
+        <mc:Choice xmlns:a14="http://schemas.microsoft.com/office/drawing/2010/main" Requires="a14">
+          <p:sp>
+            <p:nvSpPr>
+              <p:cNvPr id="28" name="ZoneTexte 27"/>
+              <p:cNvSpPr txBox="1"/>
+              <p:nvPr/>
+            </p:nvSpPr>
+            <p:spPr>
+              <a:xfrm>
+                <a:off x="2492572" y="2385265"/>
+                <a:ext cx="370165" cy="276999"/>
+              </a:xfrm>
+              <a:prstGeom prst="rect">
+                <a:avLst/>
+              </a:prstGeom>
+              <a:noFill/>
+            </p:spPr>
+            <p:txBody>
+              <a:bodyPr wrap="none" rtlCol="0">
+                <a:spAutoFit/>
+              </a:bodyPr>
+              <a:lstStyle/>
+              <a:p>
+                <a14:m>
+                  <m:oMathPara xmlns:m="http://schemas.openxmlformats.org/officeDocument/2006/math">
+                    <m:oMathParaPr>
+                      <m:jc m:val="centerGroup"/>
+                    </m:oMathParaPr>
+                    <m:oMath xmlns:m="http://schemas.openxmlformats.org/officeDocument/2006/math">
+                      <m:sSub>
+                        <m:sSubPr>
+                          <m:ctrlPr>
+                            <a:rPr lang="fr-FR" sz="1200" b="0" i="1" smtClean="0">
+                              <a:latin typeface="Cambria Math"/>
+                            </a:rPr>
+                          </m:ctrlPr>
+                        </m:sSubPr>
+                        <m:e>
+                          <m:r>
+                            <a:rPr lang="fr-FR" sz="1200" b="0" i="1" smtClean="0">
+                              <a:latin typeface="Cambria Math"/>
+                            </a:rPr>
+                            <m:t>𝑝</m:t>
+                          </m:r>
+                        </m:e>
+                        <m:sub>
+                          <m:r>
+                            <a:rPr lang="fr-FR" sz="1200" b="0" i="1" smtClean="0">
+                              <a:latin typeface="Cambria Math"/>
+                            </a:rPr>
+                            <m:t>1</m:t>
+                          </m:r>
+                        </m:sub>
+                      </m:sSub>
+                    </m:oMath>
+                  </m:oMathPara>
+                </a14:m>
+                <a:endParaRPr lang="fr-FR" sz="1200" dirty="0"/>
+              </a:p>
+            </p:txBody>
+          </p:sp>
+        </mc:Choice>
+        <mc:Fallback>
+          <p:sp>
+            <p:nvSpPr>
+              <p:cNvPr id="28" name="ZoneTexte 27"/>
+              <p:cNvSpPr txBox="1">
+                <a:spLocks noRot="1" noChangeAspect="1" noMove="1" noResize="1" noEditPoints="1" noAdjustHandles="1" noChangeArrowheads="1" noChangeShapeType="1" noTextEdit="1"/>
+              </p:cNvSpPr>
+              <p:nvPr/>
+            </p:nvSpPr>
+            <p:spPr>
+              <a:xfrm>
+                <a:off x="2492572" y="2385265"/>
+                <a:ext cx="370165" cy="276999"/>
+              </a:xfrm>
+              <a:prstGeom prst="rect">
+                <a:avLst/>
+              </a:prstGeom>
+              <a:blipFill rotWithShape="1">
+                <a:blip r:embed="rId2"/>
+                <a:stretch>
+                  <a:fillRect/>
+                </a:stretch>
+              </a:blipFill>
+            </p:spPr>
+            <p:txBody>
+              <a:bodyPr/>
+              <a:lstStyle/>
+              <a:p>
+                <a:r>
+                  <a:rPr lang="fr-FR">
+                    <a:noFill/>
+                  </a:rPr>
+                  <a:t> </a:t>
+                </a:r>
+              </a:p>
+            </p:txBody>
+          </p:sp>
+        </mc:Fallback>
+      </mc:AlternateContent>
+      <mc:AlternateContent xmlns:mc="http://schemas.openxmlformats.org/markup-compatibility/2006">
+        <mc:Choice xmlns:a14="http://schemas.microsoft.com/office/drawing/2010/main" Requires="a14">
+          <p:sp>
+            <p:nvSpPr>
+              <p:cNvPr id="29" name="ZoneTexte 28"/>
+              <p:cNvSpPr txBox="1"/>
+              <p:nvPr/>
+            </p:nvSpPr>
+            <p:spPr>
+              <a:xfrm>
+                <a:off x="2041092" y="2378122"/>
+                <a:ext cx="373756" cy="276999"/>
+              </a:xfrm>
+              <a:prstGeom prst="rect">
+                <a:avLst/>
+              </a:prstGeom>
+              <a:noFill/>
+            </p:spPr>
+            <p:txBody>
+              <a:bodyPr wrap="none" rtlCol="0">
+                <a:spAutoFit/>
+              </a:bodyPr>
+              <a:lstStyle/>
+              <a:p>
+                <a14:m>
+                  <m:oMathPara xmlns:m="http://schemas.openxmlformats.org/officeDocument/2006/math">
+                    <m:oMathParaPr>
+                      <m:jc m:val="centerGroup"/>
+                    </m:oMathParaPr>
+                    <m:oMath xmlns:m="http://schemas.openxmlformats.org/officeDocument/2006/math">
+                      <m:sSub>
+                        <m:sSubPr>
+                          <m:ctrlPr>
+                            <a:rPr lang="fr-FR" sz="1200" b="0" i="1" smtClean="0">
+                              <a:latin typeface="Cambria Math"/>
+                            </a:rPr>
+                          </m:ctrlPr>
+                        </m:sSubPr>
+                        <m:e>
+                          <m:r>
+                            <a:rPr lang="fr-FR" sz="1200" b="0" i="1" smtClean="0">
+                              <a:latin typeface="Cambria Math"/>
+                            </a:rPr>
+                            <m:t>𝑝</m:t>
+                          </m:r>
+                        </m:e>
+                        <m:sub>
+                          <m:r>
+                            <a:rPr lang="fr-FR" sz="1200" b="0" i="1" smtClean="0">
+                              <a:latin typeface="Cambria Math"/>
+                            </a:rPr>
+                            <m:t>2</m:t>
+                          </m:r>
+                        </m:sub>
+                      </m:sSub>
+                    </m:oMath>
+                  </m:oMathPara>
+                </a14:m>
+                <a:endParaRPr lang="fr-FR" sz="1200" dirty="0"/>
+              </a:p>
+            </p:txBody>
+          </p:sp>
+        </mc:Choice>
+        <mc:Fallback>
+          <p:sp>
+            <p:nvSpPr>
+              <p:cNvPr id="29" name="ZoneTexte 28"/>
+              <p:cNvSpPr txBox="1">
+                <a:spLocks noRot="1" noChangeAspect="1" noMove="1" noResize="1" noEditPoints="1" noAdjustHandles="1" noChangeArrowheads="1" noChangeShapeType="1" noTextEdit="1"/>
+              </p:cNvSpPr>
+              <p:nvPr/>
+            </p:nvSpPr>
+            <p:spPr>
+              <a:xfrm>
+                <a:off x="2041092" y="2378122"/>
+                <a:ext cx="373756" cy="276999"/>
+              </a:xfrm>
+              <a:prstGeom prst="rect">
+                <a:avLst/>
+              </a:prstGeom>
+              <a:blipFill rotWithShape="1">
+                <a:blip r:embed="rId10"/>
+                <a:stretch>
+                  <a:fillRect/>
+                </a:stretch>
+              </a:blipFill>
+            </p:spPr>
+            <p:txBody>
+              <a:bodyPr/>
+              <a:lstStyle/>
+              <a:p>
+                <a:r>
+                  <a:rPr lang="fr-FR">
+                    <a:noFill/>
+                  </a:rPr>
+                  <a:t> </a:t>
+                </a:r>
+              </a:p>
+            </p:txBody>
+          </p:sp>
+        </mc:Fallback>
+      </mc:AlternateContent>
+      <p:sp>
+        <p:nvSpPr>
+          <p:cNvPr id="30" name="Ellipse 29"/>
+          <p:cNvSpPr/>
+          <p:nvPr/>
+        </p:nvSpPr>
+        <p:spPr>
+          <a:xfrm>
+            <a:off x="1949989" y="2679595"/>
+            <a:ext cx="72008" cy="72008"/>
+          </a:xfrm>
+          <a:prstGeom prst="ellipse">
+            <a:avLst/>
+          </a:prstGeom>
+          <a:solidFill>
+            <a:schemeClr val="bg1"/>
+          </a:solidFill>
+          <a:ln w="12700">
+            <a:solidFill>
+              <a:srgbClr val="00B0F0"/>
+            </a:solidFill>
+          </a:ln>
+        </p:spPr>
+        <p:style>
+          <a:lnRef idx="2">
+            <a:schemeClr val="accent1">
+              <a:shade val="50000"/>
+            </a:schemeClr>
+          </a:lnRef>
+          <a:fillRef idx="1">
+            <a:schemeClr val="accent1"/>
+          </a:fillRef>
+          <a:effectRef idx="0">
+            <a:schemeClr val="accent1"/>
+          </a:effectRef>
+          <a:fontRef idx="minor">
+            <a:schemeClr val="lt1"/>
+          </a:fontRef>
+        </p:style>
+        <p:txBody>
+          <a:bodyPr rtlCol="0" anchor="ctr"/>
+          <a:lstStyle/>
+          <a:p>
+            <a:pPr algn="ctr"/>
+            <a:endParaRPr lang="fr-FR"/>
+          </a:p>
+        </p:txBody>
+      </p:sp>
+      <p:sp>
+        <p:nvSpPr>
+          <p:cNvPr id="31" name="Ellipse 30"/>
+          <p:cNvSpPr/>
+          <p:nvPr/>
+        </p:nvSpPr>
+        <p:spPr>
+          <a:xfrm>
+            <a:off x="387266" y="2680451"/>
+            <a:ext cx="72008" cy="72008"/>
+          </a:xfrm>
+          <a:prstGeom prst="ellipse">
+            <a:avLst/>
+          </a:prstGeom>
+          <a:solidFill>
+            <a:schemeClr val="bg1"/>
+          </a:solidFill>
+          <a:ln w="12700">
+            <a:solidFill>
+              <a:srgbClr val="00B0F0"/>
+            </a:solidFill>
+          </a:ln>
+        </p:spPr>
+        <p:style>
+          <a:lnRef idx="2">
+            <a:schemeClr val="accent1">
+              <a:shade val="50000"/>
+            </a:schemeClr>
+          </a:lnRef>
+          <a:fillRef idx="1">
+            <a:schemeClr val="accent1"/>
+          </a:fillRef>
+          <a:effectRef idx="0">
+            <a:schemeClr val="accent1"/>
+          </a:effectRef>
+          <a:fontRef idx="minor">
+            <a:schemeClr val="lt1"/>
+          </a:fontRef>
+        </p:style>
+        <p:txBody>
+          <a:bodyPr rtlCol="0" anchor="ctr"/>
+          <a:lstStyle/>
+          <a:p>
+            <a:pPr algn="ctr"/>
+            <a:endParaRPr lang="fr-FR"/>
+          </a:p>
+        </p:txBody>
+      </p:sp>
+      <mc:AlternateContent xmlns:mc="http://schemas.openxmlformats.org/markup-compatibility/2006">
+        <mc:Choice xmlns:a14="http://schemas.microsoft.com/office/drawing/2010/main" Requires="a14">
+          <p:sp>
+            <p:nvSpPr>
+              <p:cNvPr id="32" name="ZoneTexte 31"/>
+              <p:cNvSpPr txBox="1"/>
+              <p:nvPr/>
+            </p:nvSpPr>
+            <p:spPr>
+              <a:xfrm>
+                <a:off x="1799115" y="2385265"/>
+                <a:ext cx="370165" cy="276999"/>
+              </a:xfrm>
+              <a:prstGeom prst="rect">
+                <a:avLst/>
+              </a:prstGeom>
+              <a:noFill/>
+            </p:spPr>
+            <p:txBody>
+              <a:bodyPr wrap="none" rtlCol="0">
+                <a:spAutoFit/>
+              </a:bodyPr>
+              <a:lstStyle/>
+              <a:p>
+                <a14:m>
+                  <m:oMathPara xmlns:m="http://schemas.openxmlformats.org/officeDocument/2006/math">
+                    <m:oMathParaPr>
+                      <m:jc m:val="centerGroup"/>
+                    </m:oMathParaPr>
+                    <m:oMath xmlns:m="http://schemas.openxmlformats.org/officeDocument/2006/math">
+                      <m:sSub>
+                        <m:sSubPr>
+                          <m:ctrlPr>
+                            <a:rPr lang="fr-FR" sz="1200" b="0" i="1" smtClean="0">
+                              <a:latin typeface="Cambria Math"/>
+                            </a:rPr>
+                          </m:ctrlPr>
+                        </m:sSubPr>
+                        <m:e>
+                          <m:r>
+                            <a:rPr lang="fr-FR" sz="1200" b="0" i="1" smtClean="0">
+                              <a:latin typeface="Cambria Math"/>
+                            </a:rPr>
+                            <m:t>𝑝</m:t>
+                          </m:r>
+                        </m:e>
+                        <m:sub>
+                          <m:r>
+                            <a:rPr lang="fr-FR" sz="1200" b="0" i="1" smtClean="0">
+                              <a:latin typeface="Cambria Math"/>
+                            </a:rPr>
+                            <m:t>1</m:t>
+                          </m:r>
+                        </m:sub>
+                      </m:sSub>
+                    </m:oMath>
+                  </m:oMathPara>
+                </a14:m>
+                <a:endParaRPr lang="fr-FR" sz="1200" dirty="0"/>
+              </a:p>
+            </p:txBody>
+          </p:sp>
+        </mc:Choice>
+        <mc:Fallback>
+          <p:sp>
+            <p:nvSpPr>
+              <p:cNvPr id="32" name="ZoneTexte 31"/>
+              <p:cNvSpPr txBox="1">
+                <a:spLocks noRot="1" noChangeAspect="1" noMove="1" noResize="1" noEditPoints="1" noAdjustHandles="1" noChangeArrowheads="1" noChangeShapeType="1" noTextEdit="1"/>
+              </p:cNvSpPr>
+              <p:nvPr/>
+            </p:nvSpPr>
+            <p:spPr>
+              <a:xfrm>
+                <a:off x="1799115" y="2385265"/>
+                <a:ext cx="370165" cy="276999"/>
+              </a:xfrm>
+              <a:prstGeom prst="rect">
+                <a:avLst/>
+              </a:prstGeom>
+              <a:blipFill rotWithShape="1">
+                <a:blip r:embed="rId2"/>
+                <a:stretch>
+                  <a:fillRect/>
+                </a:stretch>
+              </a:blipFill>
+            </p:spPr>
+            <p:txBody>
+              <a:bodyPr/>
+              <a:lstStyle/>
+              <a:p>
+                <a:r>
+                  <a:rPr lang="fr-FR">
+                    <a:noFill/>
+                  </a:rPr>
+                  <a:t> </a:t>
+                </a:r>
+              </a:p>
+            </p:txBody>
+          </p:sp>
+        </mc:Fallback>
+      </mc:AlternateContent>
+      <mc:AlternateContent xmlns:mc="http://schemas.openxmlformats.org/markup-compatibility/2006">
+        <mc:Choice xmlns:a14="http://schemas.microsoft.com/office/drawing/2010/main" Requires="a14">
+          <p:sp>
+            <p:nvSpPr>
+              <p:cNvPr id="33" name="ZoneTexte 32"/>
+              <p:cNvSpPr txBox="1"/>
+              <p:nvPr/>
+            </p:nvSpPr>
+            <p:spPr>
+              <a:xfrm>
+                <a:off x="238187" y="2385265"/>
+                <a:ext cx="373756" cy="276999"/>
+              </a:xfrm>
+              <a:prstGeom prst="rect">
+                <a:avLst/>
+              </a:prstGeom>
+              <a:noFill/>
+            </p:spPr>
+            <p:txBody>
+              <a:bodyPr wrap="none" rtlCol="0">
+                <a:spAutoFit/>
+              </a:bodyPr>
+              <a:lstStyle/>
+              <a:p>
+                <a14:m>
+                  <m:oMathPara xmlns:m="http://schemas.openxmlformats.org/officeDocument/2006/math">
+                    <m:oMathParaPr>
+                      <m:jc m:val="centerGroup"/>
+                    </m:oMathParaPr>
+                    <m:oMath xmlns:m="http://schemas.openxmlformats.org/officeDocument/2006/math">
+                      <m:sSub>
+                        <m:sSubPr>
+                          <m:ctrlPr>
+                            <a:rPr lang="fr-FR" sz="1200" b="0" i="1" smtClean="0">
+                              <a:latin typeface="Cambria Math"/>
+                            </a:rPr>
+                          </m:ctrlPr>
+                        </m:sSubPr>
+                        <m:e>
+                          <m:r>
+                            <a:rPr lang="fr-FR" sz="1200" b="0" i="1" smtClean="0">
+                              <a:latin typeface="Cambria Math"/>
+                            </a:rPr>
+                            <m:t>𝑝</m:t>
+                          </m:r>
+                        </m:e>
+                        <m:sub>
+                          <m:r>
+                            <a:rPr lang="fr-FR" sz="1200" b="0" i="1" smtClean="0">
+                              <a:latin typeface="Cambria Math"/>
+                            </a:rPr>
+                            <m:t>2</m:t>
+                          </m:r>
+                        </m:sub>
+                      </m:sSub>
+                    </m:oMath>
+                  </m:oMathPara>
+                </a14:m>
+                <a:endParaRPr lang="fr-FR" sz="1200" dirty="0"/>
+              </a:p>
+            </p:txBody>
+          </p:sp>
+        </mc:Choice>
+        <mc:Fallback>
+          <p:sp>
+            <p:nvSpPr>
+              <p:cNvPr id="33" name="ZoneTexte 32"/>
+              <p:cNvSpPr txBox="1">
+                <a:spLocks noRot="1" noChangeAspect="1" noMove="1" noResize="1" noEditPoints="1" noAdjustHandles="1" noChangeArrowheads="1" noChangeShapeType="1" noTextEdit="1"/>
+              </p:cNvSpPr>
+              <p:nvPr/>
+            </p:nvSpPr>
+            <p:spPr>
+              <a:xfrm>
+                <a:off x="238187" y="2385265"/>
+                <a:ext cx="373756" cy="276999"/>
+              </a:xfrm>
+              <a:prstGeom prst="rect">
+                <a:avLst/>
+              </a:prstGeom>
+              <a:blipFill rotWithShape="1">
+                <a:blip r:embed="rId10"/>
+                <a:stretch>
+                  <a:fillRect/>
+                </a:stretch>
+              </a:blipFill>
+            </p:spPr>
+            <p:txBody>
+              <a:bodyPr/>
+              <a:lstStyle/>
+              <a:p>
+                <a:r>
+                  <a:rPr lang="fr-FR">
+                    <a:noFill/>
+                  </a:rPr>
+                  <a:t> </a:t>
+                </a:r>
+              </a:p>
+            </p:txBody>
+          </p:sp>
+        </mc:Fallback>
+      </mc:AlternateContent>
+      <p:cxnSp>
+        <p:nvCxnSpPr>
+          <p:cNvPr id="39" name="Connecteur droit avec flèche 38"/>
+          <p:cNvCxnSpPr>
+            <a:endCxn id="31" idx="4"/>
+          </p:cNvCxnSpPr>
+          <p:nvPr/>
+        </p:nvCxnSpPr>
+        <p:spPr>
+          <a:xfrm flipV="1">
+            <a:off x="423270" y="2752459"/>
+            <a:ext cx="0" cy="86242"/>
+          </a:xfrm>
+          <a:prstGeom prst="straightConnector1">
+            <a:avLst/>
+          </a:prstGeom>
+          <a:ln w="12700">
+            <a:solidFill>
+              <a:srgbClr val="00B0F0"/>
+            </a:solidFill>
+            <a:headEnd type="none" w="med" len="med"/>
+            <a:tailEnd type="none" w="med" len="med"/>
+          </a:ln>
+        </p:spPr>
+        <p:style>
+          <a:lnRef idx="1">
+            <a:schemeClr val="accent1"/>
+          </a:lnRef>
+          <a:fillRef idx="0">
+            <a:schemeClr val="accent1"/>
+          </a:fillRef>
+          <a:effectRef idx="0">
+            <a:schemeClr val="accent1"/>
+          </a:effectRef>
+          <a:fontRef idx="minor">
+            <a:schemeClr val="tx1"/>
+          </a:fontRef>
+        </p:style>
+      </p:cxnSp>
+      <p:cxnSp>
+        <p:nvCxnSpPr>
+          <p:cNvPr id="44" name="Connecteur droit avec flèche 43"/>
+          <p:cNvCxnSpPr/>
+          <p:nvPr/>
+        </p:nvCxnSpPr>
+        <p:spPr>
+          <a:xfrm flipV="1">
+            <a:off x="1984197" y="2751603"/>
+            <a:ext cx="0" cy="86242"/>
+          </a:xfrm>
+          <a:prstGeom prst="straightConnector1">
+            <a:avLst/>
+          </a:prstGeom>
+          <a:ln w="12700">
+            <a:solidFill>
+              <a:srgbClr val="00B0F0"/>
+            </a:solidFill>
+            <a:headEnd type="none" w="med" len="med"/>
+            <a:tailEnd type="none" w="med" len="med"/>
+          </a:ln>
+        </p:spPr>
+        <p:style>
+          <a:lnRef idx="1">
+            <a:schemeClr val="accent1"/>
+          </a:lnRef>
+          <a:fillRef idx="0">
+            <a:schemeClr val="accent1"/>
+          </a:fillRef>
+          <a:effectRef idx="0">
+            <a:schemeClr val="accent1"/>
+          </a:effectRef>
+          <a:fontRef idx="minor">
+            <a:schemeClr val="tx1"/>
+          </a:fontRef>
+        </p:style>
+      </p:cxnSp>
+      <p:cxnSp>
+        <p:nvCxnSpPr>
+          <p:cNvPr id="45" name="Connecteur droit avec flèche 44"/>
+          <p:cNvCxnSpPr/>
+          <p:nvPr/>
+        </p:nvCxnSpPr>
+        <p:spPr>
+          <a:xfrm>
+            <a:off x="423270" y="2837845"/>
+            <a:ext cx="1562723" cy="0"/>
+          </a:xfrm>
+          <a:prstGeom prst="straightConnector1">
+            <a:avLst/>
+          </a:prstGeom>
+          <a:ln w="12700">
+            <a:solidFill>
+              <a:srgbClr val="00B0F0"/>
+            </a:solidFill>
+            <a:headEnd type="none" w="med" len="med"/>
+            <a:tailEnd type="none" w="med" len="med"/>
+          </a:ln>
+        </p:spPr>
+        <p:style>
+          <a:lnRef idx="1">
+            <a:schemeClr val="accent1"/>
+          </a:lnRef>
+          <a:fillRef idx="0">
+            <a:schemeClr val="accent1"/>
+          </a:fillRef>
+          <a:effectRef idx="0">
+            <a:schemeClr val="accent1"/>
+          </a:effectRef>
+          <a:fontRef idx="minor">
+            <a:schemeClr val="tx1"/>
+          </a:fontRef>
+        </p:style>
+      </p:cxnSp>
+      <p:cxnSp>
+        <p:nvCxnSpPr>
+          <p:cNvPr id="48" name="Connecteur droit avec flèche 47"/>
+          <p:cNvCxnSpPr/>
+          <p:nvPr/>
+        </p:nvCxnSpPr>
+        <p:spPr>
+          <a:xfrm>
+            <a:off x="1202865" y="2837845"/>
+            <a:ext cx="0" cy="303123"/>
+          </a:xfrm>
+          <a:prstGeom prst="straightConnector1">
+            <a:avLst/>
+          </a:prstGeom>
+          <a:ln w="12700">
+            <a:solidFill>
+              <a:srgbClr val="00B0F0"/>
+            </a:solidFill>
+            <a:headEnd type="none" w="med" len="med"/>
+            <a:tailEnd type="stealth" w="med" len="lg"/>
+          </a:ln>
+        </p:spPr>
+        <p:style>
+          <a:lnRef idx="1">
+            <a:schemeClr val="accent1"/>
+          </a:lnRef>
+          <a:fillRef idx="0">
+            <a:schemeClr val="accent1"/>
+          </a:fillRef>
+          <a:effectRef idx="0">
+            <a:schemeClr val="accent1"/>
+          </a:effectRef>
+          <a:fontRef idx="minor">
+            <a:schemeClr val="tx1"/>
+          </a:fontRef>
+        </p:style>
+      </p:cxnSp>
+      <p:cxnSp>
+        <p:nvCxnSpPr>
+          <p:cNvPr id="52" name="Connecteur droit avec flèche 51"/>
+          <p:cNvCxnSpPr/>
+          <p:nvPr/>
+        </p:nvCxnSpPr>
+        <p:spPr>
+          <a:xfrm flipV="1">
+            <a:off x="1086470" y="2598140"/>
+            <a:ext cx="0" cy="86242"/>
+          </a:xfrm>
+          <a:prstGeom prst="straightConnector1">
+            <a:avLst/>
+          </a:prstGeom>
+          <a:ln w="12700">
+            <a:solidFill>
+              <a:srgbClr val="00B050"/>
+            </a:solidFill>
+            <a:headEnd type="none" w="med" len="med"/>
+            <a:tailEnd type="none" w="med" len="med"/>
+          </a:ln>
+        </p:spPr>
+        <p:style>
+          <a:lnRef idx="1">
+            <a:schemeClr val="accent1"/>
+          </a:lnRef>
+          <a:fillRef idx="0">
+            <a:schemeClr val="accent1"/>
+          </a:fillRef>
+          <a:effectRef idx="0">
+            <a:schemeClr val="accent1"/>
+          </a:effectRef>
+          <a:fontRef idx="minor">
+            <a:schemeClr val="tx1"/>
+          </a:fontRef>
+        </p:style>
+      </p:cxnSp>
+      <p:cxnSp>
+        <p:nvCxnSpPr>
+          <p:cNvPr id="53" name="Connecteur droit avec flèche 52"/>
+          <p:cNvCxnSpPr/>
+          <p:nvPr/>
+        </p:nvCxnSpPr>
+        <p:spPr>
+          <a:xfrm flipV="1">
+            <a:off x="1649220" y="2605256"/>
+            <a:ext cx="0" cy="86242"/>
+          </a:xfrm>
+          <a:prstGeom prst="straightConnector1">
+            <a:avLst/>
+          </a:prstGeom>
+          <a:ln w="12700">
+            <a:solidFill>
+              <a:srgbClr val="00B050"/>
+            </a:solidFill>
+            <a:headEnd type="none" w="med" len="med"/>
+            <a:tailEnd type="none" w="med" len="med"/>
+          </a:ln>
+        </p:spPr>
+        <p:style>
+          <a:lnRef idx="1">
+            <a:schemeClr val="accent1"/>
+          </a:lnRef>
+          <a:fillRef idx="0">
+            <a:schemeClr val="accent1"/>
+          </a:fillRef>
+          <a:effectRef idx="0">
+            <a:schemeClr val="accent1"/>
+          </a:effectRef>
+          <a:fontRef idx="minor">
+            <a:schemeClr val="tx1"/>
+          </a:fontRef>
+        </p:style>
+      </p:cxnSp>
+      <p:cxnSp>
+        <p:nvCxnSpPr>
+          <p:cNvPr id="54" name="Connecteur droit avec flèche 53"/>
+          <p:cNvCxnSpPr/>
+          <p:nvPr/>
+        </p:nvCxnSpPr>
+        <p:spPr>
+          <a:xfrm flipH="1">
+            <a:off x="1086470" y="2600690"/>
+            <a:ext cx="562750" cy="0"/>
+          </a:xfrm>
+          <a:prstGeom prst="straightConnector1">
+            <a:avLst/>
+          </a:prstGeom>
+          <a:ln w="12700">
+            <a:solidFill>
+              <a:srgbClr val="00B050"/>
+            </a:solidFill>
+            <a:headEnd type="none" w="med" len="med"/>
+            <a:tailEnd type="none" w="med" len="med"/>
+          </a:ln>
+        </p:spPr>
+        <p:style>
+          <a:lnRef idx="1">
+            <a:schemeClr val="accent1"/>
+          </a:lnRef>
+          <a:fillRef idx="0">
+            <a:schemeClr val="accent1"/>
+          </a:fillRef>
+          <a:effectRef idx="0">
+            <a:schemeClr val="accent1"/>
+          </a:effectRef>
+          <a:fontRef idx="minor">
+            <a:schemeClr val="tx1"/>
+          </a:fontRef>
+        </p:style>
+      </p:cxnSp>
+      <p:cxnSp>
+        <p:nvCxnSpPr>
+          <p:cNvPr id="66" name="Connecteur droit avec flèche 65"/>
+          <p:cNvCxnSpPr/>
+          <p:nvPr/>
+        </p:nvCxnSpPr>
+        <p:spPr>
+          <a:xfrm flipV="1">
+            <a:off x="1377704" y="2302133"/>
+            <a:ext cx="0" cy="303123"/>
+          </a:xfrm>
+          <a:prstGeom prst="straightConnector1">
+            <a:avLst/>
+          </a:prstGeom>
+          <a:ln w="12700">
+            <a:solidFill>
+              <a:srgbClr val="00B050"/>
+            </a:solidFill>
+            <a:headEnd type="none" w="med" len="med"/>
+            <a:tailEnd type="stealth" w="med" len="lg"/>
+          </a:ln>
+        </p:spPr>
+        <p:style>
+          <a:lnRef idx="1">
+            <a:schemeClr val="accent1"/>
+          </a:lnRef>
+          <a:fillRef idx="0">
+            <a:schemeClr val="accent1"/>
+          </a:fillRef>
+          <a:effectRef idx="0">
+            <a:schemeClr val="accent1"/>
+          </a:effectRef>
+          <a:fontRef idx="minor">
+            <a:schemeClr val="tx1"/>
+          </a:fontRef>
+        </p:style>
+      </p:cxnSp>
+      <p:cxnSp>
+        <p:nvCxnSpPr>
+          <p:cNvPr id="67" name="Connecteur droit avec flèche 66"/>
+          <p:cNvCxnSpPr/>
+          <p:nvPr/>
+        </p:nvCxnSpPr>
+        <p:spPr>
+          <a:xfrm>
+            <a:off x="2233536" y="2605809"/>
+            <a:ext cx="350674" cy="0"/>
+          </a:xfrm>
+          <a:prstGeom prst="straightConnector1">
+            <a:avLst/>
+          </a:prstGeom>
+          <a:ln w="12700">
+            <a:solidFill>
+              <a:srgbClr val="7030A0"/>
+            </a:solidFill>
+            <a:headEnd type="none" w="med" len="med"/>
+            <a:tailEnd type="none" w="med" len="med"/>
+          </a:ln>
+        </p:spPr>
+        <p:style>
+          <a:lnRef idx="1">
+            <a:schemeClr val="accent1"/>
+          </a:lnRef>
+          <a:fillRef idx="0">
+            <a:schemeClr val="accent1"/>
+          </a:fillRef>
+          <a:effectRef idx="0">
+            <a:schemeClr val="accent1"/>
+          </a:effectRef>
+          <a:fontRef idx="minor">
+            <a:schemeClr val="tx1"/>
+          </a:fontRef>
+        </p:style>
+      </p:cxnSp>
+      <p:cxnSp>
+        <p:nvCxnSpPr>
+          <p:cNvPr id="68" name="Connecteur droit avec flèche 67"/>
+          <p:cNvCxnSpPr/>
+          <p:nvPr/>
+        </p:nvCxnSpPr>
+        <p:spPr>
+          <a:xfrm flipV="1">
+            <a:off x="2233536" y="2597471"/>
+            <a:ext cx="0" cy="86242"/>
+          </a:xfrm>
+          <a:prstGeom prst="straightConnector1">
+            <a:avLst/>
+          </a:prstGeom>
+          <a:ln w="12700">
+            <a:solidFill>
+              <a:srgbClr val="7030A0"/>
+            </a:solidFill>
+            <a:headEnd type="none" w="med" len="med"/>
+            <a:tailEnd type="none" w="med" len="med"/>
+          </a:ln>
+        </p:spPr>
+        <p:style>
+          <a:lnRef idx="1">
+            <a:schemeClr val="accent1"/>
+          </a:lnRef>
+          <a:fillRef idx="0">
+            <a:schemeClr val="accent1"/>
+          </a:fillRef>
+          <a:effectRef idx="0">
+            <a:schemeClr val="accent1"/>
+          </a:effectRef>
+          <a:fontRef idx="minor">
+            <a:schemeClr val="tx1"/>
+          </a:fontRef>
+        </p:style>
+      </p:cxnSp>
+      <p:cxnSp>
+        <p:nvCxnSpPr>
+          <p:cNvPr id="73" name="Connecteur droit avec flèche 72"/>
+          <p:cNvCxnSpPr/>
+          <p:nvPr/>
+        </p:nvCxnSpPr>
+        <p:spPr>
+          <a:xfrm flipV="1">
+            <a:off x="2586006" y="2601402"/>
+            <a:ext cx="0" cy="86242"/>
+          </a:xfrm>
+          <a:prstGeom prst="straightConnector1">
+            <a:avLst/>
+          </a:prstGeom>
+          <a:ln w="12700">
+            <a:solidFill>
+              <a:srgbClr val="7030A0"/>
+            </a:solidFill>
+            <a:headEnd type="none" w="med" len="med"/>
+            <a:tailEnd type="none" w="med" len="med"/>
+          </a:ln>
+        </p:spPr>
+        <p:style>
+          <a:lnRef idx="1">
+            <a:schemeClr val="accent1"/>
+          </a:lnRef>
+          <a:fillRef idx="0">
+            <a:schemeClr val="accent1"/>
+          </a:fillRef>
+          <a:effectRef idx="0">
+            <a:schemeClr val="accent1"/>
+          </a:effectRef>
+          <a:fontRef idx="minor">
+            <a:schemeClr val="tx1"/>
+          </a:fontRef>
+        </p:style>
+      </p:cxnSp>
+      <p:cxnSp>
+        <p:nvCxnSpPr>
+          <p:cNvPr id="75" name="Connecteur droit avec flèche 74"/>
+          <p:cNvCxnSpPr/>
+          <p:nvPr/>
+        </p:nvCxnSpPr>
+        <p:spPr>
+          <a:xfrm flipV="1">
+            <a:off x="2548206" y="2060848"/>
+            <a:ext cx="259229" cy="544962"/>
+          </a:xfrm>
+          <a:prstGeom prst="straightConnector1">
+            <a:avLst/>
+          </a:prstGeom>
+          <a:ln w="12700">
+            <a:solidFill>
+              <a:srgbClr val="7030A0"/>
+            </a:solidFill>
+            <a:headEnd type="none" w="med" len="med"/>
+            <a:tailEnd type="stealth" w="med" len="lg"/>
+          </a:ln>
+        </p:spPr>
+        <p:style>
+          <a:lnRef idx="1">
+            <a:schemeClr val="accent1"/>
+          </a:lnRef>
+          <a:fillRef idx="0">
+            <a:schemeClr val="accent1"/>
+          </a:fillRef>
+          <a:effectRef idx="0">
+            <a:schemeClr val="accent1"/>
+          </a:effectRef>
+          <a:fontRef idx="minor">
+            <a:schemeClr val="tx1"/>
+          </a:fontRef>
+        </p:style>
+      </p:cxnSp>
+      <p:cxnSp>
+        <p:nvCxnSpPr>
+          <p:cNvPr id="83" name="Connecteur droit avec flèche 82"/>
+          <p:cNvCxnSpPr/>
+          <p:nvPr/>
+        </p:nvCxnSpPr>
+        <p:spPr>
+          <a:xfrm>
+            <a:off x="2971424" y="2838096"/>
+            <a:ext cx="561522" cy="0"/>
+          </a:xfrm>
+          <a:prstGeom prst="straightConnector1">
+            <a:avLst/>
+          </a:prstGeom>
+          <a:ln w="12700">
+            <a:solidFill>
+              <a:srgbClr val="FF0000"/>
+            </a:solidFill>
+            <a:headEnd type="none" w="med" len="med"/>
+            <a:tailEnd type="none" w="med" len="med"/>
+          </a:ln>
+        </p:spPr>
+        <p:style>
+          <a:lnRef idx="1">
+            <a:schemeClr val="accent1"/>
+          </a:lnRef>
+          <a:fillRef idx="0">
+            <a:schemeClr val="accent1"/>
+          </a:fillRef>
+          <a:effectRef idx="0">
+            <a:schemeClr val="accent1"/>
+          </a:effectRef>
+          <a:fontRef idx="minor">
+            <a:schemeClr val="tx1"/>
+          </a:fontRef>
+        </p:style>
+      </p:cxnSp>
+      <p:cxnSp>
+        <p:nvCxnSpPr>
+          <p:cNvPr id="85" name="Connecteur droit avec flèche 84"/>
+          <p:cNvCxnSpPr/>
+          <p:nvPr/>
+        </p:nvCxnSpPr>
+        <p:spPr>
+          <a:xfrm flipV="1">
+            <a:off x="2971424" y="2756725"/>
+            <a:ext cx="0" cy="86242"/>
+          </a:xfrm>
+          <a:prstGeom prst="straightConnector1">
+            <a:avLst/>
+          </a:prstGeom>
+          <a:ln w="12700">
+            <a:solidFill>
+              <a:srgbClr val="FF0000"/>
+            </a:solidFill>
+            <a:headEnd type="none" w="med" len="med"/>
+            <a:tailEnd type="none" w="med" len="med"/>
+          </a:ln>
+        </p:spPr>
+        <p:style>
+          <a:lnRef idx="1">
+            <a:schemeClr val="accent1"/>
+          </a:lnRef>
+          <a:fillRef idx="0">
+            <a:schemeClr val="accent1"/>
+          </a:fillRef>
+          <a:effectRef idx="0">
+            <a:schemeClr val="accent1"/>
+          </a:effectRef>
+          <a:fontRef idx="minor">
+            <a:schemeClr val="tx1"/>
+          </a:fontRef>
+        </p:style>
+      </p:cxnSp>
+      <p:cxnSp>
+        <p:nvCxnSpPr>
+          <p:cNvPr id="86" name="Connecteur droit avec flèche 85"/>
+          <p:cNvCxnSpPr/>
+          <p:nvPr/>
+        </p:nvCxnSpPr>
+        <p:spPr>
+          <a:xfrm flipV="1">
+            <a:off x="3533554" y="2756725"/>
+            <a:ext cx="0" cy="86242"/>
+          </a:xfrm>
+          <a:prstGeom prst="straightConnector1">
+            <a:avLst/>
+          </a:prstGeom>
+          <a:ln w="12700">
+            <a:solidFill>
+              <a:srgbClr val="FF0000"/>
+            </a:solidFill>
+            <a:headEnd type="none" w="med" len="med"/>
+            <a:tailEnd type="none" w="med" len="med"/>
+          </a:ln>
+        </p:spPr>
+        <p:style>
+          <a:lnRef idx="1">
+            <a:schemeClr val="accent1"/>
+          </a:lnRef>
+          <a:fillRef idx="0">
+            <a:schemeClr val="accent1"/>
+          </a:fillRef>
+          <a:effectRef idx="0">
+            <a:schemeClr val="accent1"/>
+          </a:effectRef>
+          <a:fontRef idx="minor">
+            <a:schemeClr val="tx1"/>
+          </a:fontRef>
+        </p:style>
+      </p:cxnSp>
+      <p:cxnSp>
+        <p:nvCxnSpPr>
+          <p:cNvPr id="87" name="Connecteur droit avec flèche 86"/>
+          <p:cNvCxnSpPr/>
+          <p:nvPr/>
+        </p:nvCxnSpPr>
+        <p:spPr>
+          <a:xfrm flipH="1">
+            <a:off x="3275856" y="2842968"/>
+            <a:ext cx="1" cy="298000"/>
+          </a:xfrm>
+          <a:prstGeom prst="straightConnector1">
+            <a:avLst/>
+          </a:prstGeom>
+          <a:ln w="12700">
+            <a:solidFill>
+              <a:srgbClr val="FF0000"/>
+            </a:solidFill>
+            <a:headEnd type="none" w="med" len="med"/>
+            <a:tailEnd type="stealth" w="med" len="lg"/>
+          </a:ln>
+        </p:spPr>
+        <p:style>
+          <a:lnRef idx="1">
+            <a:schemeClr val="accent1"/>
+          </a:lnRef>
+          <a:fillRef idx="0">
+            <a:schemeClr val="accent1"/>
+          </a:fillRef>
+          <a:effectRef idx="0">
+            <a:schemeClr val="accent1"/>
+          </a:effectRef>
+          <a:fontRef idx="minor">
+            <a:schemeClr val="tx1"/>
+          </a:fontRef>
+        </p:style>
+      </p:cxnSp>
+    </p:spTree>
+    <p:extLst>
+      <p:ext uri="{BB962C8B-B14F-4D97-AF65-F5344CB8AC3E}">
+        <p14:creationId xmlns:p14="http://schemas.microsoft.com/office/powerpoint/2010/main" val="3227377678"/>
+      </p:ext>
+    </p:extLst>
+  </p:cSld>
+  <p:clrMapOvr>
+    <a:masterClrMapping/>
+  </p:clrMapOvr>
+</p:sld>
+</file>
+
+<file path=ppt/slides/slide2.xml><?xml version="1.0" encoding="utf-8"?>
+<p:sld xmlns:a="http://schemas.openxmlformats.org/drawingml/2006/main" xmlns:r="http://schemas.openxmlformats.org/officeDocument/2006/relationships" xmlns:p="http://schemas.openxmlformats.org/presentationml/2006/main">
+  <p:cSld>
+    <p:spTree>
+      <p:nvGrpSpPr>
+        <p:cNvPr id="1" name=""/>
+        <p:cNvGrpSpPr/>
+        <p:nvPr/>
+      </p:nvGrpSpPr>
+      <p:grpSpPr>
+        <a:xfrm>
+          <a:off x="0" y="0"/>
+          <a:ext cx="0" cy="0"/>
+          <a:chOff x="0" y="0"/>
+          <a:chExt cx="0" cy="0"/>
+        </a:xfrm>
+      </p:grpSpPr>
+      <p:pic>
+        <p:nvPicPr>
+          <p:cNvPr id="2051" name="Picture 3" descr="C:\Enseignements\GitHub\CI_02_EtudeSLCI\6_SystemesAsservis\Cours\png\poles_3_2.png"/>
+          <p:cNvPicPr>
+            <a:picLocks noChangeAspect="1" noChangeArrowheads="1"/>
+          </p:cNvPicPr>
+          <p:nvPr/>
+        </p:nvPicPr>
+        <p:blipFill>
+          <a:blip r:embed="rId2" cstate="print">
+            <a:extLst>
+              <a:ext uri="{28A0092B-C50C-407E-A947-70E740481C1C}">
+                <a14:useLocalDpi xmlns:a14="http://schemas.microsoft.com/office/drawing/2010/main" val="0"/>
+              </a:ext>
+            </a:extLst>
+          </a:blip>
+          <a:srcRect/>
+          <a:stretch>
+            <a:fillRect/>
+          </a:stretch>
+        </p:blipFill>
+        <p:spPr bwMode="auto">
+          <a:xfrm>
+            <a:off x="2620214" y="414170"/>
+            <a:ext cx="2385432" cy="1800000"/>
+          </a:xfrm>
+          <a:prstGeom prst="rect">
+            <a:avLst/>
+          </a:prstGeom>
+          <a:noFill/>
+          <a:extLst>
+            <a:ext uri="{909E8E84-426E-40DD-AFC4-6F175D3DCCD1}">
+              <a14:hiddenFill xmlns:a14="http://schemas.microsoft.com/office/drawing/2010/main">
+                <a:solidFill>
+                  <a:srgbClr val="FFFFFF"/>
+                </a:solidFill>
+              </a14:hiddenFill>
+            </a:ext>
+          </a:extLst>
+        </p:spPr>
+      </p:pic>
+      <p:pic>
+        <p:nvPicPr>
+          <p:cNvPr id="2050" name="Picture 2" descr="C:\Enseignements\GitHub\CI_02_EtudeSLCI\6_SystemesAsservis\Cours\png\poles_3.png"/>
+          <p:cNvPicPr>
+            <a:picLocks noChangeAspect="1" noChangeArrowheads="1"/>
+          </p:cNvPicPr>
+          <p:nvPr/>
+        </p:nvPicPr>
+        <p:blipFill>
+          <a:blip r:embed="rId3" cstate="print">
+            <a:extLst>
+              <a:ext uri="{28A0092B-C50C-407E-A947-70E740481C1C}">
+                <a14:useLocalDpi xmlns:a14="http://schemas.microsoft.com/office/drawing/2010/main" val="0"/>
+              </a:ext>
+            </a:extLst>
+          </a:blip>
+          <a:srcRect/>
+          <a:stretch>
+            <a:fillRect/>
+          </a:stretch>
+        </p:blipFill>
+        <p:spPr bwMode="auto">
+          <a:xfrm>
+            <a:off x="-180937" y="414170"/>
+            <a:ext cx="2385432" cy="1800000"/>
+          </a:xfrm>
+          <a:prstGeom prst="rect">
+            <a:avLst/>
+          </a:prstGeom>
+          <a:noFill/>
+          <a:extLst>
+            <a:ext uri="{909E8E84-426E-40DD-AFC4-6F175D3DCCD1}">
+              <a14:hiddenFill xmlns:a14="http://schemas.microsoft.com/office/drawing/2010/main">
+                <a:solidFill>
+                  <a:srgbClr val="FFFFFF"/>
+                </a:solidFill>
+              </a14:hiddenFill>
+            </a:ext>
+          </a:extLst>
+        </p:spPr>
+      </p:pic>
+      <p:cxnSp>
+        <p:nvCxnSpPr>
+          <p:cNvPr id="6" name="Connecteur droit avec flèche 5"/>
+          <p:cNvCxnSpPr/>
+          <p:nvPr/>
+        </p:nvCxnSpPr>
+        <p:spPr>
+          <a:xfrm flipV="1">
+            <a:off x="2411760" y="1892293"/>
+            <a:ext cx="0" cy="1512168"/>
+          </a:xfrm>
+          <a:prstGeom prst="straightConnector1">
+            <a:avLst/>
+          </a:prstGeom>
+          <a:ln w="19050">
+            <a:solidFill>
+              <a:schemeClr val="tx2"/>
+            </a:solidFill>
+            <a:tailEnd type="stealth" w="med" len="lg"/>
+          </a:ln>
+        </p:spPr>
+        <p:style>
+          <a:lnRef idx="1">
+            <a:schemeClr val="accent1"/>
+          </a:lnRef>
+          <a:fillRef idx="0">
+            <a:schemeClr val="accent1"/>
+          </a:fillRef>
+          <a:effectRef idx="0">
+            <a:schemeClr val="accent1"/>
+          </a:effectRef>
+          <a:fontRef idx="minor">
+            <a:schemeClr val="tx1"/>
+          </a:fontRef>
+        </p:style>
+      </p:cxnSp>
+      <p:cxnSp>
+        <p:nvCxnSpPr>
+          <p:cNvPr id="7" name="Connecteur droit avec flèche 6"/>
+          <p:cNvCxnSpPr/>
+          <p:nvPr/>
+        </p:nvCxnSpPr>
+        <p:spPr>
+          <a:xfrm flipV="1">
+            <a:off x="251520" y="2720385"/>
+            <a:ext cx="3600400" cy="1"/>
+          </a:xfrm>
+          <a:prstGeom prst="straightConnector1">
+            <a:avLst/>
+          </a:prstGeom>
+          <a:ln w="19050">
+            <a:solidFill>
+              <a:schemeClr val="tx2"/>
+            </a:solidFill>
+            <a:tailEnd type="stealth" w="med" len="lg"/>
+          </a:ln>
+        </p:spPr>
+        <p:style>
+          <a:lnRef idx="1">
+            <a:schemeClr val="accent1"/>
+          </a:lnRef>
+          <a:fillRef idx="0">
+            <a:schemeClr val="accent1"/>
+          </a:fillRef>
+          <a:effectRef idx="0">
+            <a:schemeClr val="accent1"/>
+          </a:effectRef>
+          <a:fontRef idx="minor">
+            <a:schemeClr val="tx1"/>
+          </a:fontRef>
+        </p:style>
+      </p:cxnSp>
+      <mc:AlternateContent xmlns:mc="http://schemas.openxmlformats.org/markup-compatibility/2006">
+        <mc:Choice xmlns:a14="http://schemas.microsoft.com/office/drawing/2010/main" Requires="a14">
+          <p:sp>
+            <p:nvSpPr>
+              <p:cNvPr id="10" name="ZoneTexte 9"/>
+              <p:cNvSpPr txBox="1"/>
+              <p:nvPr/>
+            </p:nvSpPr>
+            <p:spPr>
+              <a:xfrm>
+                <a:off x="2017340" y="1844824"/>
+                <a:ext cx="445827" cy="307777"/>
+              </a:xfrm>
+              <a:prstGeom prst="rect">
+                <a:avLst/>
+              </a:prstGeom>
+              <a:noFill/>
+            </p:spPr>
+            <p:txBody>
+              <a:bodyPr wrap="none" rtlCol="0">
+                <a:spAutoFit/>
+              </a:bodyPr>
+              <a:lstStyle/>
+              <a:p>
+                <a14:m>
+                  <m:oMathPara xmlns:m="http://schemas.openxmlformats.org/officeDocument/2006/math">
+                    <m:oMathParaPr>
+                      <m:jc m:val="centerGroup"/>
+                    </m:oMathParaPr>
+                    <m:oMath xmlns:m="http://schemas.openxmlformats.org/officeDocument/2006/math">
+                      <m:r>
+                        <a:rPr lang="fr-FR" sz="1400" b="0" i="1" smtClean="0">
+                          <a:latin typeface="Cambria Math"/>
+                        </a:rPr>
+                        <m:t>𝐼𝑚</m:t>
+                      </m:r>
+                    </m:oMath>
+                  </m:oMathPara>
+                </a14:m>
+                <a:endParaRPr lang="fr-FR" sz="1400" dirty="0"/>
+              </a:p>
+            </p:txBody>
+          </p:sp>
+        </mc:Choice>
+        <mc:Fallback>
+          <p:sp>
+            <p:nvSpPr>
+              <p:cNvPr id="10" name="ZoneTexte 9"/>
+              <p:cNvSpPr txBox="1">
+                <a:spLocks noRot="1" noChangeAspect="1" noMove="1" noResize="1" noEditPoints="1" noAdjustHandles="1" noChangeArrowheads="1" noChangeShapeType="1" noTextEdit="1"/>
+              </p:cNvSpPr>
+              <p:nvPr/>
+            </p:nvSpPr>
+            <p:spPr>
+              <a:xfrm>
+                <a:off x="2017340" y="1844824"/>
+                <a:ext cx="445827" cy="307777"/>
+              </a:xfrm>
+              <a:prstGeom prst="rect">
+                <a:avLst/>
+              </a:prstGeom>
+              <a:blipFill rotWithShape="1">
+                <a:blip r:embed="rId4"/>
+                <a:stretch>
+                  <a:fillRect/>
+                </a:stretch>
+              </a:blipFill>
+            </p:spPr>
+            <p:txBody>
+              <a:bodyPr/>
+              <a:lstStyle/>
+              <a:p>
+                <a:r>
+                  <a:rPr lang="fr-FR">
+                    <a:noFill/>
+                  </a:rPr>
+                  <a:t> </a:t>
+                </a:r>
+              </a:p>
+            </p:txBody>
+          </p:sp>
+        </mc:Fallback>
+      </mc:AlternateContent>
+      <mc:AlternateContent xmlns:mc="http://schemas.openxmlformats.org/markup-compatibility/2006">
+        <mc:Choice xmlns:a14="http://schemas.microsoft.com/office/drawing/2010/main" Requires="a14">
+          <p:sp>
+            <p:nvSpPr>
+              <p:cNvPr id="11" name="ZoneTexte 10"/>
+              <p:cNvSpPr txBox="1"/>
+              <p:nvPr/>
+            </p:nvSpPr>
+            <p:spPr>
+              <a:xfrm>
+                <a:off x="3851920" y="2562566"/>
+                <a:ext cx="432298" cy="307777"/>
+              </a:xfrm>
+              <a:prstGeom prst="rect">
+                <a:avLst/>
+              </a:prstGeom>
+              <a:noFill/>
+            </p:spPr>
+            <p:txBody>
+              <a:bodyPr wrap="none" rtlCol="0">
+                <a:spAutoFit/>
+              </a:bodyPr>
+              <a:lstStyle/>
+              <a:p>
+                <a14:m>
+                  <m:oMathPara xmlns:m="http://schemas.openxmlformats.org/officeDocument/2006/math">
+                    <m:oMathParaPr>
+                      <m:jc m:val="centerGroup"/>
+                    </m:oMathParaPr>
+                    <m:oMath xmlns:m="http://schemas.openxmlformats.org/officeDocument/2006/math">
+                      <m:r>
+                        <a:rPr lang="fr-FR" sz="1400" b="0" i="1" smtClean="0">
+                          <a:latin typeface="Cambria Math"/>
+                        </a:rPr>
+                        <m:t>𝑅𝑒</m:t>
+                      </m:r>
+                    </m:oMath>
+                  </m:oMathPara>
+                </a14:m>
+                <a:endParaRPr lang="fr-FR" sz="1400" dirty="0"/>
+              </a:p>
+            </p:txBody>
+          </p:sp>
+        </mc:Choice>
+        <mc:Fallback>
+          <p:sp>
+            <p:nvSpPr>
+              <p:cNvPr id="11" name="ZoneTexte 10"/>
+              <p:cNvSpPr txBox="1">
+                <a:spLocks noRot="1" noChangeAspect="1" noMove="1" noResize="1" noEditPoints="1" noAdjustHandles="1" noChangeArrowheads="1" noChangeShapeType="1" noTextEdit="1"/>
+              </p:cNvSpPr>
+              <p:nvPr/>
+            </p:nvSpPr>
+            <p:spPr>
+              <a:xfrm>
+                <a:off x="3851920" y="2562566"/>
+                <a:ext cx="432298" cy="307777"/>
+              </a:xfrm>
+              <a:prstGeom prst="rect">
+                <a:avLst/>
+              </a:prstGeom>
+              <a:blipFill rotWithShape="1">
+                <a:blip r:embed="rId5"/>
+                <a:stretch>
+                  <a:fillRect/>
+                </a:stretch>
+              </a:blipFill>
+            </p:spPr>
+            <p:txBody>
+              <a:bodyPr/>
+              <a:lstStyle/>
+              <a:p>
+                <a:r>
+                  <a:rPr lang="fr-FR">
+                    <a:noFill/>
+                  </a:rPr>
+                  <a:t> </a:t>
+                </a:r>
+              </a:p>
+            </p:txBody>
+          </p:sp>
+        </mc:Fallback>
+      </mc:AlternateContent>
+      <p:sp>
+        <p:nvSpPr>
+          <p:cNvPr id="30" name="Ellipse 29"/>
+          <p:cNvSpPr/>
+          <p:nvPr/>
+        </p:nvSpPr>
+        <p:spPr>
+          <a:xfrm>
+            <a:off x="1644767" y="2214170"/>
+            <a:ext cx="72008" cy="72008"/>
+          </a:xfrm>
+          <a:prstGeom prst="ellipse">
+            <a:avLst/>
+          </a:prstGeom>
+          <a:solidFill>
+            <a:schemeClr val="bg1"/>
+          </a:solidFill>
+          <a:ln w="12700">
+            <a:solidFill>
+              <a:srgbClr val="00B0F0"/>
+            </a:solidFill>
+          </a:ln>
+        </p:spPr>
+        <p:style>
+          <a:lnRef idx="2">
+            <a:schemeClr val="accent1">
+              <a:shade val="50000"/>
+            </a:schemeClr>
+          </a:lnRef>
+          <a:fillRef idx="1">
+            <a:schemeClr val="accent1"/>
+          </a:fillRef>
+          <a:effectRef idx="0">
+            <a:schemeClr val="accent1"/>
+          </a:effectRef>
+          <a:fontRef idx="minor">
+            <a:schemeClr val="lt1"/>
+          </a:fontRef>
+        </p:style>
+        <p:txBody>
+          <a:bodyPr rtlCol="0" anchor="ctr"/>
+          <a:lstStyle/>
+          <a:p>
+            <a:pPr algn="ctr"/>
+            <a:endParaRPr lang="fr-FR"/>
+          </a:p>
+        </p:txBody>
+      </p:sp>
+      <mc:AlternateContent xmlns:mc="http://schemas.openxmlformats.org/markup-compatibility/2006">
+        <mc:Choice xmlns:a14="http://schemas.microsoft.com/office/drawing/2010/main" Requires="a14">
+          <p:sp>
+            <p:nvSpPr>
+              <p:cNvPr id="32" name="ZoneTexte 31"/>
+              <p:cNvSpPr txBox="1"/>
+              <p:nvPr/>
+            </p:nvSpPr>
+            <p:spPr>
+              <a:xfrm>
+                <a:off x="1310606" y="2112357"/>
+                <a:ext cx="370165" cy="276999"/>
+              </a:xfrm>
+              <a:prstGeom prst="rect">
+                <a:avLst/>
+              </a:prstGeom>
+              <a:noFill/>
+            </p:spPr>
+            <p:txBody>
+              <a:bodyPr wrap="none" rtlCol="0">
+                <a:spAutoFit/>
+              </a:bodyPr>
+              <a:lstStyle/>
+              <a:p>
+                <a14:m>
+                  <m:oMathPara xmlns:m="http://schemas.openxmlformats.org/officeDocument/2006/math">
+                    <m:oMathParaPr>
+                      <m:jc m:val="centerGroup"/>
+                    </m:oMathParaPr>
+                    <m:oMath xmlns:m="http://schemas.openxmlformats.org/officeDocument/2006/math">
+                      <m:sSub>
+                        <m:sSubPr>
+                          <m:ctrlPr>
+                            <a:rPr lang="fr-FR" sz="1200" b="0" i="1" smtClean="0">
+                              <a:latin typeface="Cambria Math"/>
+                            </a:rPr>
+                          </m:ctrlPr>
+                        </m:sSubPr>
+                        <m:e>
+                          <m:r>
+                            <a:rPr lang="fr-FR" sz="1200" b="0" i="1" smtClean="0">
+                              <a:latin typeface="Cambria Math"/>
+                            </a:rPr>
+                            <m:t>𝑝</m:t>
+                          </m:r>
+                        </m:e>
+                        <m:sub>
+                          <m:r>
+                            <a:rPr lang="fr-FR" sz="1200" b="0" i="1" smtClean="0">
+                              <a:latin typeface="Cambria Math"/>
+                            </a:rPr>
+                            <m:t>1</m:t>
+                          </m:r>
+                        </m:sub>
+                      </m:sSub>
+                    </m:oMath>
+                  </m:oMathPara>
+                </a14:m>
+                <a:endParaRPr lang="fr-FR" sz="1200" dirty="0"/>
+              </a:p>
+            </p:txBody>
+          </p:sp>
+        </mc:Choice>
+        <mc:Fallback>
+          <p:sp>
+            <p:nvSpPr>
+              <p:cNvPr id="32" name="ZoneTexte 31"/>
+              <p:cNvSpPr txBox="1">
+                <a:spLocks noRot="1" noChangeAspect="1" noMove="1" noResize="1" noEditPoints="1" noAdjustHandles="1" noChangeArrowheads="1" noChangeShapeType="1" noTextEdit="1"/>
+              </p:cNvSpPr>
+              <p:nvPr/>
+            </p:nvSpPr>
+            <p:spPr>
+              <a:xfrm>
+                <a:off x="1310606" y="2112357"/>
+                <a:ext cx="370165" cy="276999"/>
+              </a:xfrm>
+              <a:prstGeom prst="rect">
+                <a:avLst/>
+              </a:prstGeom>
+              <a:blipFill rotWithShape="1">
+                <a:blip r:embed="rId6"/>
+                <a:stretch>
+                  <a:fillRect/>
+                </a:stretch>
+              </a:blipFill>
+            </p:spPr>
+            <p:txBody>
+              <a:bodyPr/>
+              <a:lstStyle/>
+              <a:p>
+                <a:r>
+                  <a:rPr lang="fr-FR">
+                    <a:noFill/>
+                  </a:rPr>
+                  <a:t> </a:t>
+                </a:r>
+              </a:p>
+            </p:txBody>
+          </p:sp>
+        </mc:Fallback>
+      </mc:AlternateContent>
+      <mc:AlternateContent xmlns:mc="http://schemas.openxmlformats.org/markup-compatibility/2006">
+        <mc:Choice xmlns:a14="http://schemas.microsoft.com/office/drawing/2010/main" Requires="a14">
+          <p:sp>
+            <p:nvSpPr>
+              <p:cNvPr id="33" name="ZoneTexte 32"/>
+              <p:cNvSpPr txBox="1"/>
+              <p:nvPr/>
+            </p:nvSpPr>
+            <p:spPr>
+              <a:xfrm>
+                <a:off x="1277660" y="2966464"/>
+                <a:ext cx="373756" cy="276999"/>
+              </a:xfrm>
+              <a:prstGeom prst="rect">
+                <a:avLst/>
+              </a:prstGeom>
+              <a:noFill/>
+            </p:spPr>
+            <p:txBody>
+              <a:bodyPr wrap="none" rtlCol="0">
+                <a:spAutoFit/>
+              </a:bodyPr>
+              <a:lstStyle/>
+              <a:p>
+                <a14:m>
+                  <m:oMathPara xmlns:m="http://schemas.openxmlformats.org/officeDocument/2006/math">
+                    <m:oMathParaPr>
+                      <m:jc m:val="centerGroup"/>
+                    </m:oMathParaPr>
+                    <m:oMath xmlns:m="http://schemas.openxmlformats.org/officeDocument/2006/math">
+                      <m:sSub>
+                        <m:sSubPr>
+                          <m:ctrlPr>
+                            <a:rPr lang="fr-FR" sz="1200" b="0" i="1" smtClean="0">
+                              <a:latin typeface="Cambria Math"/>
+                            </a:rPr>
+                          </m:ctrlPr>
+                        </m:sSubPr>
+                        <m:e>
+                          <m:r>
+                            <a:rPr lang="fr-FR" sz="1200" b="0" i="1" smtClean="0">
+                              <a:latin typeface="Cambria Math"/>
+                            </a:rPr>
+                            <m:t>𝑝</m:t>
+                          </m:r>
+                        </m:e>
+                        <m:sub>
+                          <m:r>
+                            <a:rPr lang="fr-FR" sz="1200" b="0" i="1" smtClean="0">
+                              <a:latin typeface="Cambria Math"/>
+                            </a:rPr>
+                            <m:t>2</m:t>
+                          </m:r>
+                        </m:sub>
+                      </m:sSub>
+                    </m:oMath>
+                  </m:oMathPara>
+                </a14:m>
+                <a:endParaRPr lang="fr-FR" sz="1200" dirty="0"/>
+              </a:p>
+            </p:txBody>
+          </p:sp>
+        </mc:Choice>
+        <mc:Fallback>
+          <p:sp>
+            <p:nvSpPr>
+              <p:cNvPr id="33" name="ZoneTexte 32"/>
+              <p:cNvSpPr txBox="1">
+                <a:spLocks noRot="1" noChangeAspect="1" noMove="1" noResize="1" noEditPoints="1" noAdjustHandles="1" noChangeArrowheads="1" noChangeShapeType="1" noTextEdit="1"/>
+              </p:cNvSpPr>
+              <p:nvPr/>
+            </p:nvSpPr>
+            <p:spPr>
+              <a:xfrm>
+                <a:off x="1277660" y="2966464"/>
+                <a:ext cx="373756" cy="276999"/>
+              </a:xfrm>
+              <a:prstGeom prst="rect">
+                <a:avLst/>
+              </a:prstGeom>
+              <a:blipFill rotWithShape="1">
+                <a:blip r:embed="rId7"/>
+                <a:stretch>
+                  <a:fillRect/>
+                </a:stretch>
+              </a:blipFill>
+            </p:spPr>
+            <p:txBody>
+              <a:bodyPr/>
+              <a:lstStyle/>
+              <a:p>
+                <a:r>
+                  <a:rPr lang="fr-FR">
+                    <a:noFill/>
+                  </a:rPr>
+                  <a:t> </a:t>
+                </a:r>
+              </a:p>
+            </p:txBody>
+          </p:sp>
+        </mc:Fallback>
+      </mc:AlternateContent>
+      <p:cxnSp>
+        <p:nvCxnSpPr>
+          <p:cNvPr id="45" name="Connecteur droit avec flèche 44"/>
+          <p:cNvCxnSpPr>
+            <a:stCxn id="30" idx="4"/>
+            <a:endCxn id="42" idx="0"/>
+          </p:cNvCxnSpPr>
+          <p:nvPr/>
+        </p:nvCxnSpPr>
+        <p:spPr>
+          <a:xfrm>
+            <a:off x="1680771" y="2286178"/>
+            <a:ext cx="0" cy="782782"/>
+          </a:xfrm>
+          <a:prstGeom prst="straightConnector1">
+            <a:avLst/>
+          </a:prstGeom>
+          <a:ln w="12700">
+            <a:solidFill>
+              <a:srgbClr val="00B0F0"/>
+            </a:solidFill>
+            <a:headEnd type="none" w="med" len="med"/>
+            <a:tailEnd type="none" w="med" len="med"/>
+          </a:ln>
+        </p:spPr>
+        <p:style>
+          <a:lnRef idx="1">
+            <a:schemeClr val="accent1"/>
+          </a:lnRef>
+          <a:fillRef idx="0">
+            <a:schemeClr val="accent1"/>
+          </a:fillRef>
+          <a:effectRef idx="0">
+            <a:schemeClr val="accent1"/>
+          </a:effectRef>
+          <a:fontRef idx="minor">
+            <a:schemeClr val="tx1"/>
+          </a:fontRef>
+        </p:style>
+      </p:cxnSp>
+      <p:sp>
+        <p:nvSpPr>
+          <p:cNvPr id="42" name="Ellipse 41"/>
+          <p:cNvSpPr/>
+          <p:nvPr/>
+        </p:nvSpPr>
+        <p:spPr>
+          <a:xfrm>
+            <a:off x="1644767" y="3068960"/>
+            <a:ext cx="72008" cy="72008"/>
+          </a:xfrm>
+          <a:prstGeom prst="ellipse">
+            <a:avLst/>
+          </a:prstGeom>
+          <a:solidFill>
+            <a:schemeClr val="bg1"/>
+          </a:solidFill>
+          <a:ln w="12700">
+            <a:solidFill>
+              <a:srgbClr val="00B0F0"/>
+            </a:solidFill>
+          </a:ln>
+        </p:spPr>
+        <p:style>
+          <a:lnRef idx="2">
+            <a:schemeClr val="accent1">
+              <a:shade val="50000"/>
+            </a:schemeClr>
+          </a:lnRef>
+          <a:fillRef idx="1">
+            <a:schemeClr val="accent1"/>
+          </a:fillRef>
+          <a:effectRef idx="0">
+            <a:schemeClr val="accent1"/>
+          </a:effectRef>
+          <a:fontRef idx="minor">
+            <a:schemeClr val="lt1"/>
+          </a:fontRef>
+        </p:style>
+        <p:txBody>
+          <a:bodyPr rtlCol="0" anchor="ctr"/>
+          <a:lstStyle/>
+          <a:p>
+            <a:pPr algn="ctr"/>
+            <a:endParaRPr lang="fr-FR"/>
+          </a:p>
+        </p:txBody>
+      </p:sp>
+      <p:sp>
+        <p:nvSpPr>
+          <p:cNvPr id="49" name="Ellipse 48"/>
+          <p:cNvSpPr/>
+          <p:nvPr/>
+        </p:nvSpPr>
+        <p:spPr>
+          <a:xfrm>
+            <a:off x="3095836" y="2214170"/>
+            <a:ext cx="72008" cy="72008"/>
+          </a:xfrm>
+          <a:prstGeom prst="ellipse">
+            <a:avLst/>
+          </a:prstGeom>
+          <a:solidFill>
+            <a:schemeClr val="bg1"/>
+          </a:solidFill>
+          <a:ln w="12700">
+            <a:solidFill>
+              <a:srgbClr val="7030A0"/>
+            </a:solidFill>
+          </a:ln>
+        </p:spPr>
+        <p:style>
+          <a:lnRef idx="2">
+            <a:schemeClr val="accent1">
+              <a:shade val="50000"/>
+            </a:schemeClr>
+          </a:lnRef>
+          <a:fillRef idx="1">
+            <a:schemeClr val="accent1"/>
+          </a:fillRef>
+          <a:effectRef idx="0">
+            <a:schemeClr val="accent1"/>
+          </a:effectRef>
+          <a:fontRef idx="minor">
+            <a:schemeClr val="lt1"/>
+          </a:fontRef>
+        </p:style>
+        <p:txBody>
+          <a:bodyPr rtlCol="0" anchor="ctr"/>
+          <a:lstStyle/>
+          <a:p>
+            <a:pPr algn="ctr"/>
+            <a:endParaRPr lang="fr-FR"/>
+          </a:p>
+        </p:txBody>
+      </p:sp>
+      <mc:AlternateContent xmlns:mc="http://schemas.openxmlformats.org/markup-compatibility/2006">
+        <mc:Choice xmlns:a14="http://schemas.microsoft.com/office/drawing/2010/main" Requires="a14">
+          <p:sp>
+            <p:nvSpPr>
+              <p:cNvPr id="50" name="ZoneTexte 49"/>
+              <p:cNvSpPr txBox="1"/>
+              <p:nvPr/>
+            </p:nvSpPr>
+            <p:spPr>
+              <a:xfrm>
+                <a:off x="2761675" y="2112357"/>
+                <a:ext cx="370165" cy="276999"/>
+              </a:xfrm>
+              <a:prstGeom prst="rect">
+                <a:avLst/>
+              </a:prstGeom>
+              <a:noFill/>
+            </p:spPr>
+            <p:txBody>
+              <a:bodyPr wrap="none" rtlCol="0">
+                <a:spAutoFit/>
+              </a:bodyPr>
+              <a:lstStyle/>
+              <a:p>
+                <a14:m>
+                  <m:oMathPara xmlns:m="http://schemas.openxmlformats.org/officeDocument/2006/math">
+                    <m:oMathParaPr>
+                      <m:jc m:val="centerGroup"/>
+                    </m:oMathParaPr>
+                    <m:oMath xmlns:m="http://schemas.openxmlformats.org/officeDocument/2006/math">
+                      <m:sSub>
+                        <m:sSubPr>
+                          <m:ctrlPr>
+                            <a:rPr lang="fr-FR" sz="1200" b="0" i="1" smtClean="0">
+                              <a:latin typeface="Cambria Math"/>
+                            </a:rPr>
+                          </m:ctrlPr>
+                        </m:sSubPr>
+                        <m:e>
+                          <m:r>
+                            <a:rPr lang="fr-FR" sz="1200" b="0" i="1" smtClean="0">
+                              <a:latin typeface="Cambria Math"/>
+                            </a:rPr>
+                            <m:t>𝑝</m:t>
+                          </m:r>
+                        </m:e>
+                        <m:sub>
+                          <m:r>
+                            <a:rPr lang="fr-FR" sz="1200" b="0" i="1" smtClean="0">
+                              <a:latin typeface="Cambria Math"/>
+                            </a:rPr>
+                            <m:t>1</m:t>
+                          </m:r>
+                        </m:sub>
+                      </m:sSub>
+                    </m:oMath>
+                  </m:oMathPara>
+                </a14:m>
+                <a:endParaRPr lang="fr-FR" sz="1200" dirty="0"/>
+              </a:p>
+            </p:txBody>
+          </p:sp>
+        </mc:Choice>
+        <mc:Fallback>
+          <p:sp>
+            <p:nvSpPr>
+              <p:cNvPr id="50" name="ZoneTexte 49"/>
+              <p:cNvSpPr txBox="1">
+                <a:spLocks noRot="1" noChangeAspect="1" noMove="1" noResize="1" noEditPoints="1" noAdjustHandles="1" noChangeArrowheads="1" noChangeShapeType="1" noTextEdit="1"/>
+              </p:cNvSpPr>
+              <p:nvPr/>
+            </p:nvSpPr>
+            <p:spPr>
+              <a:xfrm>
+                <a:off x="2761675" y="2112357"/>
+                <a:ext cx="370165" cy="276999"/>
+              </a:xfrm>
+              <a:prstGeom prst="rect">
+                <a:avLst/>
+              </a:prstGeom>
+              <a:blipFill rotWithShape="1">
+                <a:blip r:embed="rId6"/>
+                <a:stretch>
+                  <a:fillRect/>
+                </a:stretch>
+              </a:blipFill>
+            </p:spPr>
+            <p:txBody>
+              <a:bodyPr/>
+              <a:lstStyle/>
+              <a:p>
+                <a:r>
+                  <a:rPr lang="fr-FR">
+                    <a:noFill/>
+                  </a:rPr>
+                  <a:t> </a:t>
+                </a:r>
+              </a:p>
+            </p:txBody>
+          </p:sp>
+        </mc:Fallback>
+      </mc:AlternateContent>
+      <mc:AlternateContent xmlns:mc="http://schemas.openxmlformats.org/markup-compatibility/2006">
+        <mc:Choice xmlns:a14="http://schemas.microsoft.com/office/drawing/2010/main" Requires="a14">
+          <p:sp>
+            <p:nvSpPr>
+              <p:cNvPr id="51" name="ZoneTexte 50"/>
+              <p:cNvSpPr txBox="1"/>
+              <p:nvPr/>
+            </p:nvSpPr>
+            <p:spPr>
+              <a:xfrm>
+                <a:off x="2728729" y="2966464"/>
+                <a:ext cx="373756" cy="276999"/>
+              </a:xfrm>
+              <a:prstGeom prst="rect">
+                <a:avLst/>
+              </a:prstGeom>
+              <a:noFill/>
+            </p:spPr>
+            <p:txBody>
+              <a:bodyPr wrap="none" rtlCol="0">
+                <a:spAutoFit/>
+              </a:bodyPr>
+              <a:lstStyle/>
+              <a:p>
+                <a14:m>
+                  <m:oMathPara xmlns:m="http://schemas.openxmlformats.org/officeDocument/2006/math">
+                    <m:oMathParaPr>
+                      <m:jc m:val="centerGroup"/>
+                    </m:oMathParaPr>
+                    <m:oMath xmlns:m="http://schemas.openxmlformats.org/officeDocument/2006/math">
+                      <m:sSub>
+                        <m:sSubPr>
+                          <m:ctrlPr>
+                            <a:rPr lang="fr-FR" sz="1200" b="0" i="1" smtClean="0">
+                              <a:latin typeface="Cambria Math"/>
+                            </a:rPr>
+                          </m:ctrlPr>
+                        </m:sSubPr>
+                        <m:e>
+                          <m:r>
+                            <a:rPr lang="fr-FR" sz="1200" b="0" i="1" smtClean="0">
+                              <a:latin typeface="Cambria Math"/>
+                            </a:rPr>
+                            <m:t>𝑝</m:t>
+                          </m:r>
+                        </m:e>
+                        <m:sub>
+                          <m:r>
+                            <a:rPr lang="fr-FR" sz="1200" b="0" i="1" smtClean="0">
+                              <a:latin typeface="Cambria Math"/>
+                            </a:rPr>
+                            <m:t>2</m:t>
+                          </m:r>
+                        </m:sub>
+                      </m:sSub>
+                    </m:oMath>
+                  </m:oMathPara>
+                </a14:m>
+                <a:endParaRPr lang="fr-FR" sz="1200" dirty="0"/>
+              </a:p>
+            </p:txBody>
+          </p:sp>
+        </mc:Choice>
+        <mc:Fallback>
+          <p:sp>
+            <p:nvSpPr>
+              <p:cNvPr id="51" name="ZoneTexte 50"/>
+              <p:cNvSpPr txBox="1">
+                <a:spLocks noRot="1" noChangeAspect="1" noMove="1" noResize="1" noEditPoints="1" noAdjustHandles="1" noChangeArrowheads="1" noChangeShapeType="1" noTextEdit="1"/>
+              </p:cNvSpPr>
+              <p:nvPr/>
+            </p:nvSpPr>
+            <p:spPr>
+              <a:xfrm>
+                <a:off x="2728729" y="2966464"/>
+                <a:ext cx="373756" cy="276999"/>
+              </a:xfrm>
+              <a:prstGeom prst="rect">
+                <a:avLst/>
+              </a:prstGeom>
+              <a:blipFill rotWithShape="1">
+                <a:blip r:embed="rId7"/>
+                <a:stretch>
+                  <a:fillRect/>
+                </a:stretch>
+              </a:blipFill>
+            </p:spPr>
+            <p:txBody>
+              <a:bodyPr/>
+              <a:lstStyle/>
+              <a:p>
+                <a:r>
+                  <a:rPr lang="fr-FR">
+                    <a:noFill/>
+                  </a:rPr>
+                  <a:t> </a:t>
+                </a:r>
+              </a:p>
+            </p:txBody>
+          </p:sp>
+        </mc:Fallback>
+      </mc:AlternateContent>
+      <p:cxnSp>
+        <p:nvCxnSpPr>
+          <p:cNvPr id="55" name="Connecteur droit avec flèche 54"/>
+          <p:cNvCxnSpPr>
+            <a:stCxn id="49" idx="4"/>
+            <a:endCxn id="56" idx="0"/>
+          </p:cNvCxnSpPr>
+          <p:nvPr/>
+        </p:nvCxnSpPr>
+        <p:spPr>
+          <a:xfrm>
+            <a:off x="3131840" y="2286178"/>
+            <a:ext cx="0" cy="782782"/>
+          </a:xfrm>
+          <a:prstGeom prst="straightConnector1">
+            <a:avLst/>
+          </a:prstGeom>
+          <a:ln w="12700">
+            <a:solidFill>
+              <a:srgbClr val="7030A0"/>
+            </a:solidFill>
+            <a:headEnd type="none" w="med" len="med"/>
+            <a:tailEnd type="none" w="med" len="med"/>
+          </a:ln>
+        </p:spPr>
+        <p:style>
+          <a:lnRef idx="1">
+            <a:schemeClr val="accent1"/>
+          </a:lnRef>
+          <a:fillRef idx="0">
+            <a:schemeClr val="accent1"/>
+          </a:fillRef>
+          <a:effectRef idx="0">
+            <a:schemeClr val="accent1"/>
+          </a:effectRef>
+          <a:fontRef idx="minor">
+            <a:schemeClr val="tx1"/>
+          </a:fontRef>
+        </p:style>
+      </p:cxnSp>
+      <p:sp>
+        <p:nvSpPr>
+          <p:cNvPr id="56" name="Ellipse 55"/>
+          <p:cNvSpPr/>
+          <p:nvPr/>
+        </p:nvSpPr>
+        <p:spPr>
+          <a:xfrm>
+            <a:off x="3095836" y="3068960"/>
+            <a:ext cx="72008" cy="72008"/>
+          </a:xfrm>
+          <a:prstGeom prst="ellipse">
+            <a:avLst/>
+          </a:prstGeom>
+          <a:solidFill>
+            <a:schemeClr val="bg1"/>
+          </a:solidFill>
+          <a:ln w="12700">
+            <a:solidFill>
+              <a:srgbClr val="7030A0"/>
+            </a:solidFill>
+          </a:ln>
+        </p:spPr>
+        <p:style>
+          <a:lnRef idx="2">
+            <a:schemeClr val="accent1">
+              <a:shade val="50000"/>
+            </a:schemeClr>
+          </a:lnRef>
+          <a:fillRef idx="1">
+            <a:schemeClr val="accent1"/>
+          </a:fillRef>
+          <a:effectRef idx="0">
+            <a:schemeClr val="accent1"/>
+          </a:effectRef>
+          <a:fontRef idx="minor">
+            <a:schemeClr val="lt1"/>
+          </a:fontRef>
+        </p:style>
+        <p:txBody>
+          <a:bodyPr rtlCol="0" anchor="ctr"/>
+          <a:lstStyle/>
+          <a:p>
+            <a:pPr algn="ctr"/>
+            <a:endParaRPr lang="fr-FR"/>
+          </a:p>
+        </p:txBody>
+      </p:sp>
+    </p:spTree>
+    <p:extLst>
+      <p:ext uri="{BB962C8B-B14F-4D97-AF65-F5344CB8AC3E}">
+        <p14:creationId xmlns:p14="http://schemas.microsoft.com/office/powerpoint/2010/main" val="749461850"/>
+      </p:ext>
+    </p:extLst>
+  </p:cSld>
+  <p:clrMapOvr>
+    <a:masterClrMapping/>
+  </p:clrMapOvr>
+</p:sld>
+</file>
+
+<file path=ppt/slides/slide3.xml><?xml version="1.0" encoding="utf-8"?>
 <p:sld xmlns:a="http://schemas.openxmlformats.org/drawingml/2006/main" xmlns:r="http://schemas.openxmlformats.org/officeDocument/2006/relationships" xmlns:p="http://schemas.openxmlformats.org/presentationml/2006/main">
   <p:cSld>
     <p:spTree>
@@ -5117,7 +8375,7 @@
 </p:sld>
 </file>
 
-<file path=ppt/slides/slide2.xml><?xml version="1.0" encoding="utf-8"?>
+<file path=ppt/slides/slide4.xml><?xml version="1.0" encoding="utf-8"?>
 <p:sld xmlns:a="http://schemas.openxmlformats.org/drawingml/2006/main" xmlns:r="http://schemas.openxmlformats.org/officeDocument/2006/relationships" xmlns:p="http://schemas.openxmlformats.org/presentationml/2006/main">
   <p:cSld>
     <p:spTree>
@@ -5321,13 +8579,8 @@
             <a:pPr algn="ctr"/>
             <a:r>
               <a:rPr lang="fr-FR" sz="1200" dirty="0" smtClean="0"/>
-              <a:t>Capteur de </a:t>
+              <a:t>Capteur de vitesse</a:t>
             </a:r>
-            <a:r>
-              <a:rPr lang="fr-FR" sz="1200" dirty="0" smtClean="0"/>
-              <a:t>vitesse</a:t>
-            </a:r>
-            <a:endParaRPr lang="fr-FR" sz="1200" dirty="0" smtClean="0"/>
           </a:p>
         </p:txBody>
       </p:sp>
@@ -5785,8 +9038,8 @@
           </a:fontRef>
         </p:style>
       </p:cxnSp>
-      <mc:AlternateContent xmlns:mc="http://schemas.openxmlformats.org/markup-compatibility/2006">
-        <mc:Choice xmlns:a14="http://schemas.microsoft.com/office/drawing/2010/main" Requires="a14">
+      <mc:AlternateContent xmlns:mc="http://schemas.openxmlformats.org/markup-compatibility/2006" xmlns:a14="http://schemas.microsoft.com/office/drawing/2010/main">
+        <mc:Choice Requires="a14">
           <p:sp>
             <p:nvSpPr>
               <p:cNvPr id="101" name="ZoneTexte 100"/>
@@ -5852,7 +9105,7 @@
             </p:txBody>
           </p:sp>
         </mc:Choice>
-        <mc:Fallback>
+        <mc:Fallback xmlns="">
           <p:sp>
             <p:nvSpPr>
               <p:cNvPr id="101" name="ZoneTexte 100"/>
@@ -5891,8 +9144,8 @@
           </p:sp>
         </mc:Fallback>
       </mc:AlternateContent>
-      <mc:AlternateContent xmlns:mc="http://schemas.openxmlformats.org/markup-compatibility/2006">
-        <mc:Choice xmlns:a14="http://schemas.microsoft.com/office/drawing/2010/main" Requires="a14">
+      <mc:AlternateContent xmlns:mc="http://schemas.openxmlformats.org/markup-compatibility/2006" xmlns:a14="http://schemas.microsoft.com/office/drawing/2010/main">
+        <mc:Choice Requires="a14">
           <p:sp>
             <p:nvSpPr>
               <p:cNvPr id="102" name="ZoneTexte 101"/>
@@ -5958,7 +9211,7 @@
             </p:txBody>
           </p:sp>
         </mc:Choice>
-        <mc:Fallback>
+        <mc:Fallback xmlns="">
           <p:sp>
             <p:nvSpPr>
               <p:cNvPr id="102" name="ZoneTexte 101"/>
@@ -5997,8 +9250,8 @@
           </p:sp>
         </mc:Fallback>
       </mc:AlternateContent>
-      <mc:AlternateContent xmlns:mc="http://schemas.openxmlformats.org/markup-compatibility/2006">
-        <mc:Choice xmlns:a14="http://schemas.microsoft.com/office/drawing/2010/main" Requires="a14">
+      <mc:AlternateContent xmlns:mc="http://schemas.openxmlformats.org/markup-compatibility/2006" xmlns:a14="http://schemas.microsoft.com/office/drawing/2010/main">
+        <mc:Choice Requires="a14">
           <p:sp>
             <p:nvSpPr>
               <p:cNvPr id="103" name="ZoneTexte 102"/>
@@ -6042,7 +9295,7 @@
             </p:txBody>
           </p:sp>
         </mc:Choice>
-        <mc:Fallback>
+        <mc:Fallback xmlns="">
           <p:sp>
             <p:nvSpPr>
               <p:cNvPr id="103" name="ZoneTexte 102"/>
@@ -6271,8 +9524,8 @@
           </p:sp>
         </mc:Fallback>
       </mc:AlternateContent>
-      <mc:AlternateContent xmlns:mc="http://schemas.openxmlformats.org/markup-compatibility/2006">
-        <mc:Choice xmlns:a14="http://schemas.microsoft.com/office/drawing/2010/main" Requires="a14">
+      <mc:AlternateContent xmlns:mc="http://schemas.openxmlformats.org/markup-compatibility/2006" xmlns:a14="http://schemas.microsoft.com/office/drawing/2010/main">
+        <mc:Choice Requires="a14">
           <p:sp>
             <p:nvSpPr>
               <p:cNvPr id="49" name="ZoneTexte 48"/>
@@ -6338,7 +9591,7 @@
             </p:txBody>
           </p:sp>
         </mc:Choice>
-        <mc:Fallback>
+        <mc:Fallback xmlns="">
           <p:sp>
             <p:nvSpPr>
               <p:cNvPr id="49" name="ZoneTexte 48"/>
@@ -7210,8 +10463,8 @@
           </a:fontRef>
         </p:style>
       </p:cxnSp>
-      <mc:AlternateContent xmlns:mc="http://schemas.openxmlformats.org/markup-compatibility/2006">
-        <mc:Choice xmlns:a14="http://schemas.microsoft.com/office/drawing/2010/main" Requires="a14">
+      <mc:AlternateContent xmlns:mc="http://schemas.openxmlformats.org/markup-compatibility/2006" xmlns:a14="http://schemas.microsoft.com/office/drawing/2010/main">
+        <mc:Choice Requires="a14">
           <p:sp>
             <p:nvSpPr>
               <p:cNvPr id="89" name="ZoneTexte 88"/>
@@ -7295,7 +10548,7 @@
             </p:txBody>
           </p:sp>
         </mc:Choice>
-        <mc:Fallback>
+        <mc:Fallback xmlns="">
           <p:sp>
             <p:nvSpPr>
               <p:cNvPr id="89" name="ZoneTexte 88"/>
@@ -7334,8 +10587,8 @@
           </p:sp>
         </mc:Fallback>
       </mc:AlternateContent>
-      <mc:AlternateContent xmlns:mc="http://schemas.openxmlformats.org/markup-compatibility/2006">
-        <mc:Choice xmlns:a14="http://schemas.microsoft.com/office/drawing/2010/main" Requires="a14">
+      <mc:AlternateContent xmlns:mc="http://schemas.openxmlformats.org/markup-compatibility/2006" xmlns:a14="http://schemas.microsoft.com/office/drawing/2010/main">
+        <mc:Choice Requires="a14">
           <p:sp>
             <p:nvSpPr>
               <p:cNvPr id="90" name="ZoneTexte 89"/>
@@ -7416,7 +10669,7 @@
             </p:txBody>
           </p:sp>
         </mc:Choice>
-        <mc:Fallback>
+        <mc:Fallback xmlns="">
           <p:sp>
             <p:nvSpPr>
               <p:cNvPr id="90" name="ZoneTexte 89"/>
@@ -7455,8 +10708,8 @@
           </p:sp>
         </mc:Fallback>
       </mc:AlternateContent>
-      <mc:AlternateContent xmlns:mc="http://schemas.openxmlformats.org/markup-compatibility/2006">
-        <mc:Choice xmlns:a14="http://schemas.microsoft.com/office/drawing/2010/main" Requires="a14">
+      <mc:AlternateContent xmlns:mc="http://schemas.openxmlformats.org/markup-compatibility/2006" xmlns:a14="http://schemas.microsoft.com/office/drawing/2010/main">
+        <mc:Choice Requires="a14">
           <p:sp>
             <p:nvSpPr>
               <p:cNvPr id="91" name="ZoneTexte 90"/>
@@ -7518,7 +10771,7 @@
             </p:txBody>
           </p:sp>
         </mc:Choice>
-        <mc:Fallback>
+        <mc:Fallback xmlns="">
           <p:sp>
             <p:nvSpPr>
               <p:cNvPr id="91" name="ZoneTexte 90"/>
@@ -7783,8 +11036,8 @@
           </p:sp>
         </mc:Fallback>
       </mc:AlternateContent>
-      <mc:AlternateContent xmlns:mc="http://schemas.openxmlformats.org/markup-compatibility/2006">
-        <mc:Choice xmlns:a14="http://schemas.microsoft.com/office/drawing/2010/main" Requires="a14">
+      <mc:AlternateContent xmlns:mc="http://schemas.openxmlformats.org/markup-compatibility/2006" xmlns:a14="http://schemas.microsoft.com/office/drawing/2010/main">
+        <mc:Choice Requires="a14">
           <p:sp>
             <p:nvSpPr>
               <p:cNvPr id="96" name="ZoneTexte 95"/>
@@ -7865,7 +11118,7 @@
             </p:txBody>
           </p:sp>
         </mc:Choice>
-        <mc:Fallback>
+        <mc:Fallback xmlns="">
           <p:sp>
             <p:nvSpPr>
               <p:cNvPr id="96" name="ZoneTexte 95"/>
@@ -8500,7 +11753,7 @@
 </p:sld>
 </file>
 
-<file path=ppt/slides/slide3.xml><?xml version="1.0" encoding="utf-8"?>
+<file path=ppt/slides/slide5.xml><?xml version="1.0" encoding="utf-8"?>
 <p:sld xmlns:a="http://schemas.openxmlformats.org/drawingml/2006/main" xmlns:r="http://schemas.openxmlformats.org/officeDocument/2006/relationships" xmlns:p="http://schemas.openxmlformats.org/presentationml/2006/main">
   <p:cSld>
     <p:spTree>
@@ -8517,8 +11770,8 @@
           <a:chExt cx="0" cy="0"/>
         </a:xfrm>
       </p:grpSpPr>
-      <mc:AlternateContent xmlns:mc="http://schemas.openxmlformats.org/markup-compatibility/2006">
-        <mc:Choice xmlns:a14="http://schemas.microsoft.com/office/drawing/2010/main" Requires="a14">
+      <mc:AlternateContent xmlns:mc="http://schemas.openxmlformats.org/markup-compatibility/2006" xmlns:a14="http://schemas.microsoft.com/office/drawing/2010/main">
+        <mc:Choice Requires="a14">
           <p:sp>
             <p:nvSpPr>
               <p:cNvPr id="51" name="Rectangle 50"/>
@@ -8591,7 +11844,7 @@
             </p:txBody>
           </p:sp>
         </mc:Choice>
-        <mc:Fallback>
+        <mc:Fallback xmlns="">
           <p:sp>
             <p:nvSpPr>
               <p:cNvPr id="51" name="Rectangle 50"/>
@@ -8630,8 +11883,8 @@
           </p:sp>
         </mc:Fallback>
       </mc:AlternateContent>
-      <mc:AlternateContent xmlns:mc="http://schemas.openxmlformats.org/markup-compatibility/2006">
-        <mc:Choice xmlns:a14="http://schemas.microsoft.com/office/drawing/2010/main" Requires="a14">
+      <mc:AlternateContent xmlns:mc="http://schemas.openxmlformats.org/markup-compatibility/2006" xmlns:a14="http://schemas.microsoft.com/office/drawing/2010/main">
+        <mc:Choice Requires="a14">
           <p:sp>
             <p:nvSpPr>
               <p:cNvPr id="52" name="Rectangle 51"/>
@@ -8704,7 +11957,7 @@
             </p:txBody>
           </p:sp>
         </mc:Choice>
-        <mc:Fallback>
+        <mc:Fallback xmlns="">
           <p:sp>
             <p:nvSpPr>
               <p:cNvPr id="52" name="Rectangle 51"/>
@@ -8743,8 +11996,8 @@
           </p:sp>
         </mc:Fallback>
       </mc:AlternateContent>
-      <mc:AlternateContent xmlns:mc="http://schemas.openxmlformats.org/markup-compatibility/2006">
-        <mc:Choice xmlns:a14="http://schemas.microsoft.com/office/drawing/2010/main" Requires="a14">
+      <mc:AlternateContent xmlns:mc="http://schemas.openxmlformats.org/markup-compatibility/2006" xmlns:a14="http://schemas.microsoft.com/office/drawing/2010/main">
+        <mc:Choice Requires="a14">
           <p:sp>
             <p:nvSpPr>
               <p:cNvPr id="57" name="Rectangle 56"/>
@@ -8799,7 +12052,7 @@
             </p:txBody>
           </p:sp>
         </mc:Choice>
-        <mc:Fallback>
+        <mc:Fallback xmlns="">
           <p:sp>
             <p:nvSpPr>
               <p:cNvPr id="57" name="Rectangle 56"/>
@@ -9045,8 +12298,8 @@
           </a:fontRef>
         </p:style>
       </p:cxnSp>
-      <mc:AlternateContent xmlns:mc="http://schemas.openxmlformats.org/markup-compatibility/2006">
-        <mc:Choice xmlns:a14="http://schemas.microsoft.com/office/drawing/2010/main" Requires="a14">
+      <mc:AlternateContent xmlns:mc="http://schemas.openxmlformats.org/markup-compatibility/2006" xmlns:a14="http://schemas.microsoft.com/office/drawing/2010/main">
+        <mc:Choice Requires="a14">
           <p:sp>
             <p:nvSpPr>
               <p:cNvPr id="69" name="Rectangle 68"/>
@@ -9119,7 +12372,7 @@
             </p:txBody>
           </p:sp>
         </mc:Choice>
-        <mc:Fallback>
+        <mc:Fallback xmlns="">
           <p:sp>
             <p:nvSpPr>
               <p:cNvPr id="69" name="Rectangle 68"/>
@@ -9371,8 +12624,8 @@
           </a:fontRef>
         </p:style>
       </p:cxnSp>
-      <mc:AlternateContent xmlns:mc="http://schemas.openxmlformats.org/markup-compatibility/2006">
-        <mc:Choice xmlns:a14="http://schemas.microsoft.com/office/drawing/2010/main" Requires="a14">
+      <mc:AlternateContent xmlns:mc="http://schemas.openxmlformats.org/markup-compatibility/2006" xmlns:a14="http://schemas.microsoft.com/office/drawing/2010/main">
+        <mc:Choice Requires="a14">
           <p:sp>
             <p:nvSpPr>
               <p:cNvPr id="108" name="Rectangle 107"/>
@@ -9445,7 +12698,7 @@
             </p:txBody>
           </p:sp>
         </mc:Choice>
-        <mc:Fallback>
+        <mc:Fallback xmlns="">
           <p:sp>
             <p:nvSpPr>
               <p:cNvPr id="108" name="Rectangle 107"/>
@@ -9484,8 +12737,8 @@
           </p:sp>
         </mc:Fallback>
       </mc:AlternateContent>
-      <mc:AlternateContent xmlns:mc="http://schemas.openxmlformats.org/markup-compatibility/2006">
-        <mc:Choice xmlns:a14="http://schemas.microsoft.com/office/drawing/2010/main" Requires="a14">
+      <mc:AlternateContent xmlns:mc="http://schemas.openxmlformats.org/markup-compatibility/2006" xmlns:a14="http://schemas.microsoft.com/office/drawing/2010/main">
+        <mc:Choice Requires="a14">
           <p:sp>
             <p:nvSpPr>
               <p:cNvPr id="115" name="Rectangle 114"/>
@@ -9558,7 +12811,7 @@
             </p:txBody>
           </p:sp>
         </mc:Choice>
-        <mc:Fallback>
+        <mc:Fallback xmlns="">
           <p:sp>
             <p:nvSpPr>
               <p:cNvPr id="115" name="Rectangle 114"/>
@@ -9804,8 +13057,8 @@
           </a:fontRef>
         </p:style>
       </p:cxnSp>
-      <mc:AlternateContent xmlns:mc="http://schemas.openxmlformats.org/markup-compatibility/2006">
-        <mc:Choice xmlns:a14="http://schemas.microsoft.com/office/drawing/2010/main" Requires="a14">
+      <mc:AlternateContent xmlns:mc="http://schemas.openxmlformats.org/markup-compatibility/2006" xmlns:a14="http://schemas.microsoft.com/office/drawing/2010/main">
+        <mc:Choice Requires="a14">
           <p:sp>
             <p:nvSpPr>
               <p:cNvPr id="128" name="Rectangle 127"/>
@@ -9878,7 +13131,7 @@
             </p:txBody>
           </p:sp>
         </mc:Choice>
-        <mc:Fallback>
+        <mc:Fallback xmlns="">
           <p:sp>
             <p:nvSpPr>
               <p:cNvPr id="128" name="Rectangle 127"/>
@@ -10105,7 +13358,7 @@
 </p:sld>
 </file>
 
-<file path=ppt/slides/slide4.xml><?xml version="1.0" encoding="utf-8"?>
+<file path=ppt/slides/slide6.xml><?xml version="1.0" encoding="utf-8"?>
 <p:sld xmlns:a="http://schemas.openxmlformats.org/drawingml/2006/main" xmlns:r="http://schemas.openxmlformats.org/officeDocument/2006/relationships" xmlns:p="http://schemas.openxmlformats.org/presentationml/2006/main">
   <p:cSld>
     <p:spTree>
@@ -10122,8 +13375,8 @@
           <a:chExt cx="0" cy="0"/>
         </a:xfrm>
       </p:grpSpPr>
-      <mc:AlternateContent xmlns:mc="http://schemas.openxmlformats.org/markup-compatibility/2006">
-        <mc:Choice xmlns:a14="http://schemas.microsoft.com/office/drawing/2010/main" Requires="a14">
+      <mc:AlternateContent xmlns:mc="http://schemas.openxmlformats.org/markup-compatibility/2006" xmlns:a14="http://schemas.microsoft.com/office/drawing/2010/main">
+        <mc:Choice Requires="a14">
           <p:sp>
             <p:nvSpPr>
               <p:cNvPr id="51" name="Rectangle 50"/>
@@ -10196,7 +13449,7 @@
             </p:txBody>
           </p:sp>
         </mc:Choice>
-        <mc:Fallback>
+        <mc:Fallback xmlns="">
           <p:sp>
             <p:nvSpPr>
               <p:cNvPr id="51" name="Rectangle 50"/>
@@ -10235,8 +13488,8 @@
           </p:sp>
         </mc:Fallback>
       </mc:AlternateContent>
-      <mc:AlternateContent xmlns:mc="http://schemas.openxmlformats.org/markup-compatibility/2006">
-        <mc:Choice xmlns:a14="http://schemas.microsoft.com/office/drawing/2010/main" Requires="a14">
+      <mc:AlternateContent xmlns:mc="http://schemas.openxmlformats.org/markup-compatibility/2006" xmlns:a14="http://schemas.microsoft.com/office/drawing/2010/main">
+        <mc:Choice Requires="a14">
           <p:sp>
             <p:nvSpPr>
               <p:cNvPr id="52" name="Rectangle 51"/>
@@ -10309,7 +13562,7 @@
             </p:txBody>
           </p:sp>
         </mc:Choice>
-        <mc:Fallback>
+        <mc:Fallback xmlns="">
           <p:sp>
             <p:nvSpPr>
               <p:cNvPr id="52" name="Rectangle 51"/>
@@ -10348,8 +13601,8 @@
           </p:sp>
         </mc:Fallback>
       </mc:AlternateContent>
-      <mc:AlternateContent xmlns:mc="http://schemas.openxmlformats.org/markup-compatibility/2006">
-        <mc:Choice xmlns:a14="http://schemas.microsoft.com/office/drawing/2010/main" Requires="a14">
+      <mc:AlternateContent xmlns:mc="http://schemas.openxmlformats.org/markup-compatibility/2006" xmlns:a14="http://schemas.microsoft.com/office/drawing/2010/main">
+        <mc:Choice Requires="a14">
           <p:sp>
             <p:nvSpPr>
               <p:cNvPr id="57" name="Rectangle 56"/>
@@ -10422,7 +13675,7 @@
             </p:txBody>
           </p:sp>
         </mc:Choice>
-        <mc:Fallback>
+        <mc:Fallback xmlns="">
           <p:sp>
             <p:nvSpPr>
               <p:cNvPr id="57" name="Rectangle 56"/>
@@ -11009,8 +14262,8 @@
           </a:fontRef>
         </p:style>
       </p:cxnSp>
-      <mc:AlternateContent xmlns:mc="http://schemas.openxmlformats.org/markup-compatibility/2006">
-        <mc:Choice xmlns:a14="http://schemas.microsoft.com/office/drawing/2010/main" Requires="a14">
+      <mc:AlternateContent xmlns:mc="http://schemas.openxmlformats.org/markup-compatibility/2006" xmlns:a14="http://schemas.microsoft.com/office/drawing/2010/main">
+        <mc:Choice Requires="a14">
           <p:sp>
             <p:nvSpPr>
               <p:cNvPr id="44" name="ZoneTexte 43"/>
@@ -11072,7 +14325,7 @@
             </p:txBody>
           </p:sp>
         </mc:Choice>
-        <mc:Fallback>
+        <mc:Fallback xmlns="">
           <p:sp>
             <p:nvSpPr>
               <p:cNvPr id="44" name="ZoneTexte 43"/>
@@ -11111,8 +14364,8 @@
           </p:sp>
         </mc:Fallback>
       </mc:AlternateContent>
-      <mc:AlternateContent xmlns:mc="http://schemas.openxmlformats.org/markup-compatibility/2006">
-        <mc:Choice xmlns:a14="http://schemas.microsoft.com/office/drawing/2010/main" Requires="a14">
+      <mc:AlternateContent xmlns:mc="http://schemas.openxmlformats.org/markup-compatibility/2006" xmlns:a14="http://schemas.microsoft.com/office/drawing/2010/main">
+        <mc:Choice Requires="a14">
           <p:sp>
             <p:nvSpPr>
               <p:cNvPr id="45" name="ZoneTexte 44"/>
@@ -11174,7 +14427,7 @@
             </p:txBody>
           </p:sp>
         </mc:Choice>
-        <mc:Fallback>
+        <mc:Fallback xmlns="">
           <p:sp>
             <p:nvSpPr>
               <p:cNvPr id="45" name="ZoneTexte 44"/>
@@ -11213,8 +14466,8 @@
           </p:sp>
         </mc:Fallback>
       </mc:AlternateContent>
-      <mc:AlternateContent xmlns:mc="http://schemas.openxmlformats.org/markup-compatibility/2006">
-        <mc:Choice xmlns:a14="http://schemas.microsoft.com/office/drawing/2010/main" Requires="a14">
+      <mc:AlternateContent xmlns:mc="http://schemas.openxmlformats.org/markup-compatibility/2006" xmlns:a14="http://schemas.microsoft.com/office/drawing/2010/main">
+        <mc:Choice Requires="a14">
           <p:sp>
             <p:nvSpPr>
               <p:cNvPr id="46" name="ZoneTexte 45"/>
@@ -11276,7 +14529,7 @@
             </p:txBody>
           </p:sp>
         </mc:Choice>
-        <mc:Fallback>
+        <mc:Fallback xmlns="">
           <p:sp>
             <p:nvSpPr>
               <p:cNvPr id="46" name="ZoneTexte 45"/>
@@ -11315,8 +14568,8 @@
           </p:sp>
         </mc:Fallback>
       </mc:AlternateContent>
-      <mc:AlternateContent xmlns:mc="http://schemas.openxmlformats.org/markup-compatibility/2006">
-        <mc:Choice xmlns:a14="http://schemas.microsoft.com/office/drawing/2010/main" Requires="a14">
+      <mc:AlternateContent xmlns:mc="http://schemas.openxmlformats.org/markup-compatibility/2006" xmlns:a14="http://schemas.microsoft.com/office/drawing/2010/main">
+        <mc:Choice Requires="a14">
           <p:sp>
             <p:nvSpPr>
               <p:cNvPr id="83" name="Rectangle 82"/>
@@ -11389,7 +14642,7 @@
             </p:txBody>
           </p:sp>
         </mc:Choice>
-        <mc:Fallback>
+        <mc:Fallback xmlns="">
           <p:sp>
             <p:nvSpPr>
               <p:cNvPr id="83" name="Rectangle 82"/>
@@ -11428,8 +14681,8 @@
           </p:sp>
         </mc:Fallback>
       </mc:AlternateContent>
-      <mc:AlternateContent xmlns:mc="http://schemas.openxmlformats.org/markup-compatibility/2006">
-        <mc:Choice xmlns:a14="http://schemas.microsoft.com/office/drawing/2010/main" Requires="a14">
+      <mc:AlternateContent xmlns:mc="http://schemas.openxmlformats.org/markup-compatibility/2006" xmlns:a14="http://schemas.microsoft.com/office/drawing/2010/main">
+        <mc:Choice Requires="a14">
           <p:sp>
             <p:nvSpPr>
               <p:cNvPr id="85" name="Rectangle 84"/>
@@ -11502,7 +14755,7 @@
             </p:txBody>
           </p:sp>
         </mc:Choice>
-        <mc:Fallback>
+        <mc:Fallback xmlns="">
           <p:sp>
             <p:nvSpPr>
               <p:cNvPr id="85" name="Rectangle 84"/>
@@ -11541,8 +14794,8 @@
           </p:sp>
         </mc:Fallback>
       </mc:AlternateContent>
-      <mc:AlternateContent xmlns:mc="http://schemas.openxmlformats.org/markup-compatibility/2006">
-        <mc:Choice xmlns:a14="http://schemas.microsoft.com/office/drawing/2010/main" Requires="a14">
+      <mc:AlternateContent xmlns:mc="http://schemas.openxmlformats.org/markup-compatibility/2006" xmlns:a14="http://schemas.microsoft.com/office/drawing/2010/main">
+        <mc:Choice Requires="a14">
           <p:sp>
             <p:nvSpPr>
               <p:cNvPr id="86" name="Rectangle 85"/>
@@ -11615,7 +14868,7 @@
             </p:txBody>
           </p:sp>
         </mc:Choice>
-        <mc:Fallback>
+        <mc:Fallback xmlns="">
           <p:sp>
             <p:nvSpPr>
               <p:cNvPr id="86" name="Rectangle 85"/>
@@ -12035,8 +15288,8 @@
           </a:fontRef>
         </p:style>
       </p:cxnSp>
-      <mc:AlternateContent xmlns:mc="http://schemas.openxmlformats.org/markup-compatibility/2006">
-        <mc:Choice xmlns:a14="http://schemas.microsoft.com/office/drawing/2010/main" Requires="a14">
+      <mc:AlternateContent xmlns:mc="http://schemas.openxmlformats.org/markup-compatibility/2006" xmlns:a14="http://schemas.microsoft.com/office/drawing/2010/main">
+        <mc:Choice Requires="a14">
           <p:sp>
             <p:nvSpPr>
               <p:cNvPr id="104" name="ZoneTexte 103"/>
@@ -12098,7 +15351,7 @@
             </p:txBody>
           </p:sp>
         </mc:Choice>
-        <mc:Fallback>
+        <mc:Fallback xmlns="">
           <p:sp>
             <p:nvSpPr>
               <p:cNvPr id="104" name="ZoneTexte 103"/>
@@ -12137,8 +15390,8 @@
           </p:sp>
         </mc:Fallback>
       </mc:AlternateContent>
-      <mc:AlternateContent xmlns:mc="http://schemas.openxmlformats.org/markup-compatibility/2006">
-        <mc:Choice xmlns:a14="http://schemas.microsoft.com/office/drawing/2010/main" Requires="a14">
+      <mc:AlternateContent xmlns:mc="http://schemas.openxmlformats.org/markup-compatibility/2006" xmlns:a14="http://schemas.microsoft.com/office/drawing/2010/main">
+        <mc:Choice Requires="a14">
           <p:sp>
             <p:nvSpPr>
               <p:cNvPr id="106" name="ZoneTexte 105"/>
@@ -12200,7 +15453,7 @@
             </p:txBody>
           </p:sp>
         </mc:Choice>
-        <mc:Fallback>
+        <mc:Fallback xmlns="">
           <p:sp>
             <p:nvSpPr>
               <p:cNvPr id="106" name="ZoneTexte 105"/>
@@ -12252,7 +15505,7 @@
 </p:sld>
 </file>
 
-<file path=ppt/slides/slide5.xml><?xml version="1.0" encoding="utf-8"?>
+<file path=ppt/slides/slide7.xml><?xml version="1.0" encoding="utf-8"?>
 <p:sld xmlns:a="http://schemas.openxmlformats.org/drawingml/2006/main" xmlns:r="http://schemas.openxmlformats.org/officeDocument/2006/relationships" xmlns:p="http://schemas.openxmlformats.org/presentationml/2006/main">
   <p:cSld>
     <p:spTree>
@@ -12504,8 +15757,8 @@
           </a:p>
         </p:txBody>
       </p:sp>
-      <mc:AlternateContent xmlns:mc="http://schemas.openxmlformats.org/markup-compatibility/2006">
-        <mc:Choice xmlns:a14="http://schemas.microsoft.com/office/drawing/2010/main" Requires="a14">
+      <mc:AlternateContent xmlns:mc="http://schemas.openxmlformats.org/markup-compatibility/2006" xmlns:a14="http://schemas.microsoft.com/office/drawing/2010/main">
+        <mc:Choice Requires="a14">
           <p:graphicFrame>
             <p:nvGraphicFramePr>
               <p:cNvPr id="11" name="Tableau 10"/>
@@ -12693,6 +15946,7 @@
                         <a:bodyPr/>
                         <a:lstStyle/>
                         <a:p>
+                          <a:pPr/>
                           <a14:m>
                             <m:oMathPara xmlns:m="http://schemas.openxmlformats.org/officeDocument/2006/math">
                               <m:oMathParaPr>
@@ -12866,7 +16120,7 @@
             </a:graphic>
           </p:graphicFrame>
         </mc:Choice>
-        <mc:Fallback>
+        <mc:Fallback xmlns="">
           <p:graphicFrame>
             <p:nvGraphicFramePr>
               <p:cNvPr id="11" name="Tableau 10"/>

</xml_diff>